<commit_message>
Interdiff between v2 and v3
</commit_message>
<xml_diff>
--- a/docs/Diagrams.pptx
+++ b/docs/Diagrams.pptx
@@ -305,7 +305,7 @@
           <a:p>
             <a:fld id="{78C97017-6FC3-485B-9764-EAC9E56C1D49}" type="datetimeFigureOut">
               <a:rPr lang="en-US" smtClean="0"/>
-              <a:t>8/6/2018</a:t>
+              <a:t>8/7/2018</a:t>
             </a:fld>
             <a:endParaRPr lang="en-US"/>
           </a:p>
@@ -473,7 +473,7 @@
           <a:p>
             <a:fld id="{78C97017-6FC3-485B-9764-EAC9E56C1D49}" type="datetimeFigureOut">
               <a:rPr lang="en-US" smtClean="0"/>
-              <a:t>8/6/2018</a:t>
+              <a:t>8/7/2018</a:t>
             </a:fld>
             <a:endParaRPr lang="en-US"/>
           </a:p>
@@ -651,7 +651,7 @@
           <a:p>
             <a:fld id="{78C97017-6FC3-485B-9764-EAC9E56C1D49}" type="datetimeFigureOut">
               <a:rPr lang="en-US" smtClean="0"/>
-              <a:t>8/6/2018</a:t>
+              <a:t>8/7/2018</a:t>
             </a:fld>
             <a:endParaRPr lang="en-US"/>
           </a:p>
@@ -819,7 +819,7 @@
           <a:p>
             <a:fld id="{78C97017-6FC3-485B-9764-EAC9E56C1D49}" type="datetimeFigureOut">
               <a:rPr lang="en-US" smtClean="0"/>
-              <a:t>8/6/2018</a:t>
+              <a:t>8/7/2018</a:t>
             </a:fld>
             <a:endParaRPr lang="en-US"/>
           </a:p>
@@ -1064,7 +1064,7 @@
           <a:p>
             <a:fld id="{78C97017-6FC3-485B-9764-EAC9E56C1D49}" type="datetimeFigureOut">
               <a:rPr lang="en-US" smtClean="0"/>
-              <a:t>8/6/2018</a:t>
+              <a:t>8/7/2018</a:t>
             </a:fld>
             <a:endParaRPr lang="en-US"/>
           </a:p>
@@ -1349,7 +1349,7 @@
           <a:p>
             <a:fld id="{78C97017-6FC3-485B-9764-EAC9E56C1D49}" type="datetimeFigureOut">
               <a:rPr lang="en-US" smtClean="0"/>
-              <a:t>8/6/2018</a:t>
+              <a:t>8/7/2018</a:t>
             </a:fld>
             <a:endParaRPr lang="en-US"/>
           </a:p>
@@ -1768,7 +1768,7 @@
           <a:p>
             <a:fld id="{78C97017-6FC3-485B-9764-EAC9E56C1D49}" type="datetimeFigureOut">
               <a:rPr lang="en-US" smtClean="0"/>
-              <a:t>8/6/2018</a:t>
+              <a:t>8/7/2018</a:t>
             </a:fld>
             <a:endParaRPr lang="en-US"/>
           </a:p>
@@ -1885,7 +1885,7 @@
           <a:p>
             <a:fld id="{78C97017-6FC3-485B-9764-EAC9E56C1D49}" type="datetimeFigureOut">
               <a:rPr lang="en-US" smtClean="0"/>
-              <a:t>8/6/2018</a:t>
+              <a:t>8/7/2018</a:t>
             </a:fld>
             <a:endParaRPr lang="en-US"/>
           </a:p>
@@ -1980,7 +1980,7 @@
           <a:p>
             <a:fld id="{78C97017-6FC3-485B-9764-EAC9E56C1D49}" type="datetimeFigureOut">
               <a:rPr lang="en-US" smtClean="0"/>
-              <a:t>8/6/2018</a:t>
+              <a:t>8/7/2018</a:t>
             </a:fld>
             <a:endParaRPr lang="en-US"/>
           </a:p>
@@ -2255,7 +2255,7 @@
           <a:p>
             <a:fld id="{78C97017-6FC3-485B-9764-EAC9E56C1D49}" type="datetimeFigureOut">
               <a:rPr lang="en-US" smtClean="0"/>
-              <a:t>8/6/2018</a:t>
+              <a:t>8/7/2018</a:t>
             </a:fld>
             <a:endParaRPr lang="en-US"/>
           </a:p>
@@ -2507,7 +2507,7 @@
           <a:p>
             <a:fld id="{78C97017-6FC3-485B-9764-EAC9E56C1D49}" type="datetimeFigureOut">
               <a:rPr lang="en-US" smtClean="0"/>
-              <a:t>8/6/2018</a:t>
+              <a:t>8/7/2018</a:t>
             </a:fld>
             <a:endParaRPr lang="en-US"/>
           </a:p>
@@ -2718,7 +2718,7 @@
           <a:p>
             <a:fld id="{78C97017-6FC3-485B-9764-EAC9E56C1D49}" type="datetimeFigureOut">
               <a:rPr lang="en-US" smtClean="0"/>
-              <a:t>8/6/2018</a:t>
+              <a:t>8/7/2018</a:t>
             </a:fld>
             <a:endParaRPr lang="en-US"/>
           </a:p>
@@ -3794,47 +3794,6 @@
       </p:cxnSp>
       <p:cxnSp>
         <p:nvCxnSpPr>
-          <p:cNvPr id="62" name="Elbow Connector 61"/>
-          <p:cNvCxnSpPr>
-            <a:cxnSpLocks/>
-            <a:stCxn id="19" idx="0"/>
-            <a:endCxn id="79" idx="2"/>
-          </p:cNvCxnSpPr>
-          <p:nvPr/>
-        </p:nvCxnSpPr>
-        <p:spPr>
-          <a:xfrm rot="16200000" flipV="1">
-            <a:off x="5503457" y="3559969"/>
-            <a:ext cx="367740" cy="6441"/>
-          </a:xfrm>
-          <a:prstGeom prst="bentConnector3">
-            <a:avLst>
-              <a:gd name="adj1" fmla="val 50000"/>
-            </a:avLst>
-          </a:prstGeom>
-          <a:ln w="19050">
-            <a:headEnd type="none" w="med" len="med"/>
-            <a:tailEnd type="arrow" w="med" len="med"/>
-          </a:ln>
-          <a:effectLst/>
-        </p:spPr>
-        <p:style>
-          <a:lnRef idx="1">
-            <a:schemeClr val="accent6"/>
-          </a:lnRef>
-          <a:fillRef idx="2">
-            <a:schemeClr val="accent6"/>
-          </a:fillRef>
-          <a:effectRef idx="1">
-            <a:schemeClr val="accent6"/>
-          </a:effectRef>
-          <a:fontRef idx="minor">
-            <a:schemeClr val="dk1"/>
-          </a:fontRef>
-        </p:style>
-      </p:cxnSp>
-      <p:cxnSp>
-        <p:nvCxnSpPr>
           <p:cNvPr id="65" name="Elbow Connector 64"/>
           <p:cNvCxnSpPr>
             <a:stCxn id="90" idx="3"/>
@@ -3955,50 +3914,6 @@
       </p:cxnSp>
       <p:sp>
         <p:nvSpPr>
-          <p:cNvPr id="79" name="Rectangle 78"/>
-          <p:cNvSpPr/>
-          <p:nvPr/>
-        </p:nvSpPr>
-        <p:spPr>
-          <a:xfrm>
-            <a:off x="5219458" y="3032560"/>
-            <a:ext cx="929296" cy="346760"/>
-          </a:xfrm>
-          <a:prstGeom prst="rect">
-            <a:avLst/>
-          </a:prstGeom>
-          <a:ln w="19050"/>
-          <a:effectLst/>
-        </p:spPr>
-        <p:style>
-          <a:lnRef idx="1">
-            <a:schemeClr val="accent6"/>
-          </a:lnRef>
-          <a:fillRef idx="2">
-            <a:schemeClr val="accent6"/>
-          </a:fillRef>
-          <a:effectRef idx="1">
-            <a:schemeClr val="accent6"/>
-          </a:effectRef>
-          <a:fontRef idx="minor">
-            <a:schemeClr val="dk1"/>
-          </a:fontRef>
-        </p:style>
-        <p:txBody>
-          <a:bodyPr rtlCol="0" anchor="ctr"/>
-          <a:lstStyle/>
-          <a:p>
-            <a:pPr algn="ctr"/>
-            <a:r>
-              <a:rPr lang="en-US" sz="1050" dirty="0"/>
-              <a:t>Tag</a:t>
-            </a:r>
-            <a:endParaRPr lang="en-SG" sz="1050" dirty="0"/>
-          </a:p>
-        </p:txBody>
-      </p:sp>
-      <p:sp>
-        <p:nvSpPr>
           <p:cNvPr id="90" name="Flowchart: Decision 89"/>
           <p:cNvSpPr/>
           <p:nvPr/>
@@ -5593,7 +5508,7 @@
         </p:nvSpPr>
         <p:spPr>
           <a:xfrm>
-            <a:off x="5735698" y="3369448"/>
+            <a:off x="6553456" y="2866496"/>
             <a:ext cx="88232" cy="369332"/>
           </a:xfrm>
           <a:prstGeom prst="rect">
@@ -5617,6 +5532,100 @@
               </a:rPr>
               <a:t>*</a:t>
             </a:r>
+          </a:p>
+        </p:txBody>
+      </p:sp>
+      <p:cxnSp>
+        <p:nvCxnSpPr>
+          <p:cNvPr id="61" name="Elbow Connector 92">
+            <a:extLst>
+              <a:ext uri="{FF2B5EF4-FFF2-40B4-BE49-F238E27FC236}">
+                <a16:creationId xmlns:a16="http://schemas.microsoft.com/office/drawing/2014/main" id="{69AFBE68-00A9-433D-8882-F849D6F6765E}"/>
+              </a:ext>
+            </a:extLst>
+          </p:cNvPr>
+          <p:cNvCxnSpPr>
+            <a:cxnSpLocks/>
+            <a:endCxn id="64" idx="1"/>
+          </p:cNvCxnSpPr>
+          <p:nvPr/>
+        </p:nvCxnSpPr>
+        <p:spPr>
+          <a:xfrm rot="5400000" flipH="1" flipV="1">
+            <a:off x="6290246" y="3483113"/>
+            <a:ext cx="787422" cy="183591"/>
+          </a:xfrm>
+          <a:prstGeom prst="bentConnector2">
+            <a:avLst/>
+          </a:prstGeom>
+          <a:ln w="19050">
+            <a:headEnd type="none" w="med" len="med"/>
+            <a:tailEnd type="arrow" w="med" len="med"/>
+          </a:ln>
+          <a:effectLst/>
+        </p:spPr>
+        <p:style>
+          <a:lnRef idx="1">
+            <a:schemeClr val="accent6"/>
+          </a:lnRef>
+          <a:fillRef idx="2">
+            <a:schemeClr val="accent6"/>
+          </a:fillRef>
+          <a:effectRef idx="1">
+            <a:schemeClr val="accent6"/>
+          </a:effectRef>
+          <a:fontRef idx="minor">
+            <a:schemeClr val="dk1"/>
+          </a:fontRef>
+        </p:style>
+      </p:cxnSp>
+      <p:sp>
+        <p:nvSpPr>
+          <p:cNvPr id="64" name="Rectangle 63">
+            <a:extLst>
+              <a:ext uri="{FF2B5EF4-FFF2-40B4-BE49-F238E27FC236}">
+                <a16:creationId xmlns:a16="http://schemas.microsoft.com/office/drawing/2014/main" id="{69672A69-0DC3-4881-B543-9E8CC98C9D17}"/>
+              </a:ext>
+            </a:extLst>
+          </p:cNvPr>
+          <p:cNvSpPr/>
+          <p:nvPr/>
+        </p:nvSpPr>
+        <p:spPr>
+          <a:xfrm>
+            <a:off x="6775753" y="3007817"/>
+            <a:ext cx="929296" cy="346760"/>
+          </a:xfrm>
+          <a:prstGeom prst="rect">
+            <a:avLst/>
+          </a:prstGeom>
+          <a:ln w="19050"/>
+          <a:effectLst/>
+        </p:spPr>
+        <p:style>
+          <a:lnRef idx="1">
+            <a:schemeClr val="accent4"/>
+          </a:lnRef>
+          <a:fillRef idx="2">
+            <a:schemeClr val="accent4"/>
+          </a:fillRef>
+          <a:effectRef idx="1">
+            <a:schemeClr val="accent4"/>
+          </a:effectRef>
+          <a:fontRef idx="minor">
+            <a:schemeClr val="dk1"/>
+          </a:fontRef>
+        </p:style>
+        <p:txBody>
+          <a:bodyPr rtlCol="0" anchor="ctr"/>
+          <a:lstStyle/>
+          <a:p>
+            <a:pPr algn="ctr"/>
+            <a:r>
+              <a:rPr lang="en-US" sz="1050" dirty="0"/>
+              <a:t>Tag</a:t>
+            </a:r>
+            <a:endParaRPr lang="en-SG" sz="1050" dirty="0"/>
           </a:p>
         </p:txBody>
       </p:sp>
@@ -7081,50 +7090,6 @@
       </p:cxnSp>
       <p:sp>
         <p:nvSpPr>
-          <p:cNvPr id="39" name="Rectangle 78"/>
-          <p:cNvSpPr/>
-          <p:nvPr/>
-        </p:nvSpPr>
-        <p:spPr>
-          <a:xfrm>
-            <a:off x="4190165" y="517686"/>
-            <a:ext cx="929296" cy="346760"/>
-          </a:xfrm>
-          <a:prstGeom prst="rect">
-            <a:avLst/>
-          </a:prstGeom>
-          <a:ln w="19050"/>
-          <a:effectLst/>
-        </p:spPr>
-        <p:style>
-          <a:lnRef idx="1">
-            <a:schemeClr val="accent6"/>
-          </a:lnRef>
-          <a:fillRef idx="2">
-            <a:schemeClr val="accent6"/>
-          </a:fillRef>
-          <a:effectRef idx="1">
-            <a:schemeClr val="accent6"/>
-          </a:effectRef>
-          <a:fontRef idx="minor">
-            <a:schemeClr val="dk1"/>
-          </a:fontRef>
-        </p:style>
-        <p:txBody>
-          <a:bodyPr rtlCol="0" anchor="ctr"/>
-          <a:lstStyle/>
-          <a:p>
-            <a:pPr algn="ctr"/>
-            <a:r>
-              <a:rPr lang="en-US" sz="1050" dirty="0"/>
-              <a:t>Tag</a:t>
-            </a:r>
-            <a:endParaRPr lang="en-SG" sz="1050" dirty="0"/>
-          </a:p>
-        </p:txBody>
-      </p:sp>
-      <p:sp>
-        <p:nvSpPr>
           <p:cNvPr id="41" name="Flowchart: Decision 99"/>
           <p:cNvSpPr/>
           <p:nvPr/>
@@ -7293,8 +7258,8 @@
         <p:nvCxnSpPr>
           <p:cNvPr id="49" name="Straight Arrow Connector 48"/>
           <p:cNvCxnSpPr>
+            <a:cxnSpLocks/>
             <a:stCxn id="35" idx="0"/>
-            <a:endCxn id="39" idx="2"/>
           </p:cNvCxnSpPr>
           <p:nvPr/>
         </p:nvCxnSpPr>
@@ -7518,6 +7483,108 @@
               </a:rPr>
               <a:t>*</a:t>
             </a:r>
+          </a:p>
+        </p:txBody>
+      </p:sp>
+      <p:sp>
+        <p:nvSpPr>
+          <p:cNvPr id="47" name="Rectangle 6">
+            <a:extLst>
+              <a:ext uri="{FF2B5EF4-FFF2-40B4-BE49-F238E27FC236}">
+                <a16:creationId xmlns:a16="http://schemas.microsoft.com/office/drawing/2014/main" id="{2BCA4B2E-33C0-499B-8F0A-E39754DA533E}"/>
+              </a:ext>
+            </a:extLst>
+          </p:cNvPr>
+          <p:cNvSpPr/>
+          <p:nvPr/>
+        </p:nvSpPr>
+        <p:spPr>
+          <a:xfrm>
+            <a:off x="4190165" y="508573"/>
+            <a:ext cx="929296" cy="342611"/>
+          </a:xfrm>
+          <a:prstGeom prst="rect">
+            <a:avLst/>
+          </a:prstGeom>
+          <a:ln w="19050"/>
+          <a:effectLst/>
+        </p:spPr>
+        <p:style>
+          <a:lnRef idx="1">
+            <a:schemeClr val="accent4"/>
+          </a:lnRef>
+          <a:fillRef idx="2">
+            <a:schemeClr val="accent4"/>
+          </a:fillRef>
+          <a:effectRef idx="1">
+            <a:schemeClr val="accent4"/>
+          </a:effectRef>
+          <a:fontRef idx="minor">
+            <a:schemeClr val="dk1"/>
+          </a:fontRef>
+        </p:style>
+        <p:txBody>
+          <a:bodyPr rtlCol="0" anchor="ctr"/>
+          <a:lstStyle/>
+          <a:p>
+            <a:pPr algn="ctr"/>
+            <a:r>
+              <a:rPr lang="en-SG" sz="1050" dirty="0"/>
+              <a:t>Tag</a:t>
+            </a:r>
+          </a:p>
+        </p:txBody>
+      </p:sp>
+      <p:sp>
+        <p:nvSpPr>
+          <p:cNvPr id="48" name="Flowchart: Decision 47">
+            <a:extLst>
+              <a:ext uri="{FF2B5EF4-FFF2-40B4-BE49-F238E27FC236}">
+                <a16:creationId xmlns:a16="http://schemas.microsoft.com/office/drawing/2014/main" id="{C80A0EAB-3C63-4587-9324-06EA9E915443}"/>
+              </a:ext>
+            </a:extLst>
+          </p:cNvPr>
+          <p:cNvSpPr/>
+          <p:nvPr/>
+        </p:nvSpPr>
+        <p:spPr>
+          <a:xfrm>
+            <a:off x="4533108" y="1600200"/>
+            <a:ext cx="236048" cy="214819"/>
+          </a:xfrm>
+          <a:prstGeom prst="flowChartDecision">
+            <a:avLst/>
+          </a:prstGeom>
+          <a:solidFill>
+            <a:schemeClr val="accent6"/>
+          </a:solidFill>
+          <a:ln w="19050"/>
+          <a:effectLst/>
+        </p:spPr>
+        <p:style>
+          <a:lnRef idx="1">
+            <a:schemeClr val="accent6"/>
+          </a:lnRef>
+          <a:fillRef idx="2">
+            <a:schemeClr val="accent6"/>
+          </a:fillRef>
+          <a:effectRef idx="1">
+            <a:schemeClr val="accent6"/>
+          </a:effectRef>
+          <a:fontRef idx="minor">
+            <a:schemeClr val="dk1"/>
+          </a:fontRef>
+        </p:style>
+        <p:txBody>
+          <a:bodyPr rtlCol="0" anchor="ctr"/>
+          <a:lstStyle/>
+          <a:p>
+            <a:pPr algn="ctr"/>
+            <a:endParaRPr lang="en-US" sz="1050">
+              <a:solidFill>
+                <a:schemeClr val="dk1"/>
+              </a:solidFill>
+            </a:endParaRPr>
           </a:p>
         </p:txBody>
       </p:sp>
@@ -7732,50 +7799,6 @@
       </p:cxnSp>
       <p:sp>
         <p:nvSpPr>
-          <p:cNvPr id="8" name="Rectangle 78"/>
-          <p:cNvSpPr/>
-          <p:nvPr/>
-        </p:nvSpPr>
-        <p:spPr>
-          <a:xfrm>
-            <a:off x="4190165" y="517686"/>
-            <a:ext cx="929296" cy="346760"/>
-          </a:xfrm>
-          <a:prstGeom prst="rect">
-            <a:avLst/>
-          </a:prstGeom>
-          <a:ln w="19050"/>
-          <a:effectLst/>
-        </p:spPr>
-        <p:style>
-          <a:lnRef idx="1">
-            <a:schemeClr val="accent6"/>
-          </a:lnRef>
-          <a:fillRef idx="2">
-            <a:schemeClr val="accent6"/>
-          </a:fillRef>
-          <a:effectRef idx="1">
-            <a:schemeClr val="accent6"/>
-          </a:effectRef>
-          <a:fontRef idx="minor">
-            <a:schemeClr val="dk1"/>
-          </a:fontRef>
-        </p:style>
-        <p:txBody>
-          <a:bodyPr rtlCol="0" anchor="ctr"/>
-          <a:lstStyle/>
-          <a:p>
-            <a:pPr algn="ctr"/>
-            <a:r>
-              <a:rPr lang="en-US" sz="1050" dirty="0"/>
-              <a:t>Tag</a:t>
-            </a:r>
-            <a:endParaRPr lang="en-SG" sz="1050" dirty="0"/>
-          </a:p>
-        </p:txBody>
-      </p:sp>
-      <p:sp>
-        <p:nvSpPr>
           <p:cNvPr id="10" name="Flowchart: Decision 99"/>
           <p:cNvSpPr/>
           <p:nvPr/>
@@ -7944,8 +7967,8 @@
         <p:nvCxnSpPr>
           <p:cNvPr id="15" name="Straight Arrow Connector 48"/>
           <p:cNvCxnSpPr>
+            <a:cxnSpLocks/>
             <a:stCxn id="5" idx="0"/>
-            <a:endCxn id="8" idx="2"/>
           </p:cNvCxnSpPr>
           <p:nvPr/>
         </p:nvCxnSpPr>
@@ -8212,6 +8235,108 @@
                 </a:solidFill>
               </a:rPr>
               <a:t>*</a:t>
+            </a:r>
+          </a:p>
+        </p:txBody>
+      </p:sp>
+      <p:sp>
+        <p:nvSpPr>
+          <p:cNvPr id="19" name="Flowchart: Decision 18">
+            <a:extLst>
+              <a:ext uri="{FF2B5EF4-FFF2-40B4-BE49-F238E27FC236}">
+                <a16:creationId xmlns:a16="http://schemas.microsoft.com/office/drawing/2014/main" id="{DCD92E83-9683-4CE1-AE57-B3BE1E853163}"/>
+              </a:ext>
+            </a:extLst>
+          </p:cNvPr>
+          <p:cNvSpPr/>
+          <p:nvPr/>
+        </p:nvSpPr>
+        <p:spPr>
+          <a:xfrm>
+            <a:off x="4536789" y="1647438"/>
+            <a:ext cx="236048" cy="173380"/>
+          </a:xfrm>
+          <a:prstGeom prst="flowChartDecision">
+            <a:avLst/>
+          </a:prstGeom>
+          <a:solidFill>
+            <a:schemeClr val="accent6"/>
+          </a:solidFill>
+          <a:ln w="19050"/>
+          <a:effectLst/>
+        </p:spPr>
+        <p:style>
+          <a:lnRef idx="1">
+            <a:schemeClr val="accent6"/>
+          </a:lnRef>
+          <a:fillRef idx="2">
+            <a:schemeClr val="accent6"/>
+          </a:fillRef>
+          <a:effectRef idx="1">
+            <a:schemeClr val="accent6"/>
+          </a:effectRef>
+          <a:fontRef idx="minor">
+            <a:schemeClr val="dk1"/>
+          </a:fontRef>
+        </p:style>
+        <p:txBody>
+          <a:bodyPr rtlCol="0" anchor="ctr"/>
+          <a:lstStyle/>
+          <a:p>
+            <a:pPr algn="ctr"/>
+            <a:endParaRPr lang="en-US" sz="1050">
+              <a:solidFill>
+                <a:schemeClr val="dk1"/>
+              </a:solidFill>
+            </a:endParaRPr>
+          </a:p>
+        </p:txBody>
+      </p:sp>
+      <p:sp>
+        <p:nvSpPr>
+          <p:cNvPr id="23" name="Rectangle 6">
+            <a:extLst>
+              <a:ext uri="{FF2B5EF4-FFF2-40B4-BE49-F238E27FC236}">
+                <a16:creationId xmlns:a16="http://schemas.microsoft.com/office/drawing/2014/main" id="{2A3380B6-3211-46D7-B1E4-229305E41FB3}"/>
+              </a:ext>
+            </a:extLst>
+          </p:cNvPr>
+          <p:cNvSpPr/>
+          <p:nvPr/>
+        </p:nvSpPr>
+        <p:spPr>
+          <a:xfrm>
+            <a:off x="4190165" y="509814"/>
+            <a:ext cx="929296" cy="342611"/>
+          </a:xfrm>
+          <a:prstGeom prst="rect">
+            <a:avLst/>
+          </a:prstGeom>
+          <a:ln w="19050"/>
+          <a:effectLst/>
+        </p:spPr>
+        <p:style>
+          <a:lnRef idx="1">
+            <a:schemeClr val="accent4"/>
+          </a:lnRef>
+          <a:fillRef idx="2">
+            <a:schemeClr val="accent4"/>
+          </a:fillRef>
+          <a:effectRef idx="1">
+            <a:schemeClr val="accent4"/>
+          </a:effectRef>
+          <a:fontRef idx="minor">
+            <a:schemeClr val="dk1"/>
+          </a:fontRef>
+        </p:style>
+        <p:txBody>
+          <a:bodyPr rtlCol="0" anchor="ctr"/>
+          <a:lstStyle/>
+          <a:p>
+            <a:pPr algn="ctr"/>
+            <a:r>
+              <a:rPr lang="en-SG" sz="1050" dirty="0"/>
+              <a:t>Tag</a:t>
             </a:r>
           </a:p>
         </p:txBody>

</xml_diff>

<commit_message>
docs: update component on UniqueTagList
AddressBook previously had a UniqueTagList linked to it as the
master tag list, which was reflected in the architecture diagrams
in the DeveloperGuide and LearningOutcomes.

Since AddressBook does not use a master tag list anymore, and
UniqueTagList has been removed, these architecture diagrams are no
longer consistent with the program.

Let's update these architecture diagrams in the DeveloperGuide
and LearningOutcomes.
</commit_message>
<xml_diff>
--- a/docs/Diagrams.pptx
+++ b/docs/Diagrams.pptx
@@ -164,10 +164,9 @@
           <a:lstStyle/>
           <a:p>
             <a:r>
-              <a:rPr lang="en-US" smtClean="0"/>
+              <a:rPr lang="en-US"/>
               <a:t>Click to edit Master title style</a:t>
             </a:r>
-            <a:endParaRPr lang="en-US"/>
           </a:p>
         </p:txBody>
       </p:sp>
@@ -283,10 +282,9 @@
           </a:lstStyle>
           <a:p>
             <a:r>
-              <a:rPr lang="en-US" smtClean="0"/>
+              <a:rPr lang="en-US"/>
               <a:t>Click to edit Master subtitle style</a:t>
             </a:r>
-            <a:endParaRPr lang="en-US"/>
           </a:p>
         </p:txBody>
       </p:sp>
@@ -307,7 +305,7 @@
           <a:p>
             <a:fld id="{78C97017-6FC3-485B-9764-EAC9E56C1D49}" type="datetimeFigureOut">
               <a:rPr lang="en-US" smtClean="0"/>
-              <a:t>8/31/2017</a:t>
+              <a:t>8/7/2018</a:t>
             </a:fld>
             <a:endParaRPr lang="en-US"/>
           </a:p>
@@ -401,10 +399,9 @@
           <a:lstStyle/>
           <a:p>
             <a:r>
-              <a:rPr lang="en-US" smtClean="0"/>
+              <a:rPr lang="en-US"/>
               <a:t>Click to edit Master title style</a:t>
             </a:r>
-            <a:endParaRPr lang="en-US"/>
           </a:p>
         </p:txBody>
       </p:sp>
@@ -425,38 +422,37 @@
           <a:p>
             <a:pPr lvl="0"/>
             <a:r>
-              <a:rPr lang="en-US" smtClean="0"/>
+              <a:rPr lang="en-US"/>
               <a:t>Click to edit Master text styles</a:t>
             </a:r>
           </a:p>
           <a:p>
             <a:pPr lvl="1"/>
             <a:r>
-              <a:rPr lang="en-US" smtClean="0"/>
+              <a:rPr lang="en-US"/>
               <a:t>Second level</a:t>
             </a:r>
           </a:p>
           <a:p>
             <a:pPr lvl="2"/>
             <a:r>
-              <a:rPr lang="en-US" smtClean="0"/>
+              <a:rPr lang="en-US"/>
               <a:t>Third level</a:t>
             </a:r>
           </a:p>
           <a:p>
             <a:pPr lvl="3"/>
             <a:r>
-              <a:rPr lang="en-US" smtClean="0"/>
+              <a:rPr lang="en-US"/>
               <a:t>Fourth level</a:t>
             </a:r>
           </a:p>
           <a:p>
             <a:pPr lvl="4"/>
             <a:r>
-              <a:rPr lang="en-US" smtClean="0"/>
+              <a:rPr lang="en-US"/>
               <a:t>Fifth level</a:t>
             </a:r>
-            <a:endParaRPr lang="en-US"/>
           </a:p>
         </p:txBody>
       </p:sp>
@@ -477,7 +473,7 @@
           <a:p>
             <a:fld id="{78C97017-6FC3-485B-9764-EAC9E56C1D49}" type="datetimeFigureOut">
               <a:rPr lang="en-US" smtClean="0"/>
-              <a:t>8/31/2017</a:t>
+              <a:t>8/7/2018</a:t>
             </a:fld>
             <a:endParaRPr lang="en-US"/>
           </a:p>
@@ -576,10 +572,9 @@
           <a:lstStyle/>
           <a:p>
             <a:r>
-              <a:rPr lang="en-US" smtClean="0"/>
+              <a:rPr lang="en-US"/>
               <a:t>Click to edit Master title style</a:t>
             </a:r>
-            <a:endParaRPr lang="en-US"/>
           </a:p>
         </p:txBody>
       </p:sp>
@@ -605,38 +600,37 @@
           <a:p>
             <a:pPr lvl="0"/>
             <a:r>
-              <a:rPr lang="en-US" smtClean="0"/>
+              <a:rPr lang="en-US"/>
               <a:t>Click to edit Master text styles</a:t>
             </a:r>
           </a:p>
           <a:p>
             <a:pPr lvl="1"/>
             <a:r>
-              <a:rPr lang="en-US" smtClean="0"/>
+              <a:rPr lang="en-US"/>
               <a:t>Second level</a:t>
             </a:r>
           </a:p>
           <a:p>
             <a:pPr lvl="2"/>
             <a:r>
-              <a:rPr lang="en-US" smtClean="0"/>
+              <a:rPr lang="en-US"/>
               <a:t>Third level</a:t>
             </a:r>
           </a:p>
           <a:p>
             <a:pPr lvl="3"/>
             <a:r>
-              <a:rPr lang="en-US" smtClean="0"/>
+              <a:rPr lang="en-US"/>
               <a:t>Fourth level</a:t>
             </a:r>
           </a:p>
           <a:p>
             <a:pPr lvl="4"/>
             <a:r>
-              <a:rPr lang="en-US" smtClean="0"/>
+              <a:rPr lang="en-US"/>
               <a:t>Fifth level</a:t>
             </a:r>
-            <a:endParaRPr lang="en-US"/>
           </a:p>
         </p:txBody>
       </p:sp>
@@ -657,7 +651,7 @@
           <a:p>
             <a:fld id="{78C97017-6FC3-485B-9764-EAC9E56C1D49}" type="datetimeFigureOut">
               <a:rPr lang="en-US" smtClean="0"/>
-              <a:t>8/31/2017</a:t>
+              <a:t>8/7/2018</a:t>
             </a:fld>
             <a:endParaRPr lang="en-US"/>
           </a:p>
@@ -751,10 +745,9 @@
           <a:lstStyle/>
           <a:p>
             <a:r>
-              <a:rPr lang="en-US" smtClean="0"/>
+              <a:rPr lang="en-US"/>
               <a:t>Click to edit Master title style</a:t>
             </a:r>
-            <a:endParaRPr lang="en-US"/>
           </a:p>
         </p:txBody>
       </p:sp>
@@ -775,38 +768,37 @@
           <a:p>
             <a:pPr lvl="0"/>
             <a:r>
-              <a:rPr lang="en-US" smtClean="0"/>
+              <a:rPr lang="en-US"/>
               <a:t>Click to edit Master text styles</a:t>
             </a:r>
           </a:p>
           <a:p>
             <a:pPr lvl="1"/>
             <a:r>
-              <a:rPr lang="en-US" smtClean="0"/>
+              <a:rPr lang="en-US"/>
               <a:t>Second level</a:t>
             </a:r>
           </a:p>
           <a:p>
             <a:pPr lvl="2"/>
             <a:r>
-              <a:rPr lang="en-US" smtClean="0"/>
+              <a:rPr lang="en-US"/>
               <a:t>Third level</a:t>
             </a:r>
           </a:p>
           <a:p>
             <a:pPr lvl="3"/>
             <a:r>
-              <a:rPr lang="en-US" smtClean="0"/>
+              <a:rPr lang="en-US"/>
               <a:t>Fourth level</a:t>
             </a:r>
           </a:p>
           <a:p>
             <a:pPr lvl="4"/>
             <a:r>
-              <a:rPr lang="en-US" smtClean="0"/>
+              <a:rPr lang="en-US"/>
               <a:t>Fifth level</a:t>
             </a:r>
-            <a:endParaRPr lang="en-US"/>
           </a:p>
         </p:txBody>
       </p:sp>
@@ -827,7 +819,7 @@
           <a:p>
             <a:fld id="{78C97017-6FC3-485B-9764-EAC9E56C1D49}" type="datetimeFigureOut">
               <a:rPr lang="en-US" smtClean="0"/>
-              <a:t>8/31/2017</a:t>
+              <a:t>8/7/2018</a:t>
             </a:fld>
             <a:endParaRPr lang="en-US"/>
           </a:p>
@@ -930,10 +922,9 @@
           </a:lstStyle>
           <a:p>
             <a:r>
-              <a:rPr lang="en-US" smtClean="0"/>
+              <a:rPr lang="en-US"/>
               <a:t>Click to edit Master title style</a:t>
             </a:r>
-            <a:endParaRPr lang="en-US"/>
           </a:p>
         </p:txBody>
       </p:sp>
@@ -1050,7 +1041,7 @@
           <a:p>
             <a:pPr lvl="0"/>
             <a:r>
-              <a:rPr lang="en-US" smtClean="0"/>
+              <a:rPr lang="en-US"/>
               <a:t>Click to edit Master text styles</a:t>
             </a:r>
           </a:p>
@@ -1073,7 +1064,7 @@
           <a:p>
             <a:fld id="{78C97017-6FC3-485B-9764-EAC9E56C1D49}" type="datetimeFigureOut">
               <a:rPr lang="en-US" smtClean="0"/>
-              <a:t>8/31/2017</a:t>
+              <a:t>8/7/2018</a:t>
             </a:fld>
             <a:endParaRPr lang="en-US"/>
           </a:p>
@@ -1167,10 +1158,9 @@
           <a:lstStyle/>
           <a:p>
             <a:r>
-              <a:rPr lang="en-US" smtClean="0"/>
+              <a:rPr lang="en-US"/>
               <a:t>Click to edit Master title style</a:t>
             </a:r>
-            <a:endParaRPr lang="en-US"/>
           </a:p>
         </p:txBody>
       </p:sp>
@@ -1224,38 +1214,37 @@
           <a:p>
             <a:pPr lvl="0"/>
             <a:r>
-              <a:rPr lang="en-US" smtClean="0"/>
+              <a:rPr lang="en-US"/>
               <a:t>Click to edit Master text styles</a:t>
             </a:r>
           </a:p>
           <a:p>
             <a:pPr lvl="1"/>
             <a:r>
-              <a:rPr lang="en-US" smtClean="0"/>
+              <a:rPr lang="en-US"/>
               <a:t>Second level</a:t>
             </a:r>
           </a:p>
           <a:p>
             <a:pPr lvl="2"/>
             <a:r>
-              <a:rPr lang="en-US" smtClean="0"/>
+              <a:rPr lang="en-US"/>
               <a:t>Third level</a:t>
             </a:r>
           </a:p>
           <a:p>
             <a:pPr lvl="3"/>
             <a:r>
-              <a:rPr lang="en-US" smtClean="0"/>
+              <a:rPr lang="en-US"/>
               <a:t>Fourth level</a:t>
             </a:r>
           </a:p>
           <a:p>
             <a:pPr lvl="4"/>
             <a:r>
-              <a:rPr lang="en-US" smtClean="0"/>
+              <a:rPr lang="en-US"/>
               <a:t>Fifth level</a:t>
             </a:r>
-            <a:endParaRPr lang="en-US"/>
           </a:p>
         </p:txBody>
       </p:sp>
@@ -1309,38 +1298,37 @@
           <a:p>
             <a:pPr lvl="0"/>
             <a:r>
-              <a:rPr lang="en-US" smtClean="0"/>
+              <a:rPr lang="en-US"/>
               <a:t>Click to edit Master text styles</a:t>
             </a:r>
           </a:p>
           <a:p>
             <a:pPr lvl="1"/>
             <a:r>
-              <a:rPr lang="en-US" smtClean="0"/>
+              <a:rPr lang="en-US"/>
               <a:t>Second level</a:t>
             </a:r>
           </a:p>
           <a:p>
             <a:pPr lvl="2"/>
             <a:r>
-              <a:rPr lang="en-US" smtClean="0"/>
+              <a:rPr lang="en-US"/>
               <a:t>Third level</a:t>
             </a:r>
           </a:p>
           <a:p>
             <a:pPr lvl="3"/>
             <a:r>
-              <a:rPr lang="en-US" smtClean="0"/>
+              <a:rPr lang="en-US"/>
               <a:t>Fourth level</a:t>
             </a:r>
           </a:p>
           <a:p>
             <a:pPr lvl="4"/>
             <a:r>
-              <a:rPr lang="en-US" smtClean="0"/>
+              <a:rPr lang="en-US"/>
               <a:t>Fifth level</a:t>
             </a:r>
-            <a:endParaRPr lang="en-US"/>
           </a:p>
         </p:txBody>
       </p:sp>
@@ -1361,7 +1349,7 @@
           <a:p>
             <a:fld id="{78C97017-6FC3-485B-9764-EAC9E56C1D49}" type="datetimeFigureOut">
               <a:rPr lang="en-US" smtClean="0"/>
-              <a:t>8/31/2017</a:t>
+              <a:t>8/7/2018</a:t>
             </a:fld>
             <a:endParaRPr lang="en-US"/>
           </a:p>
@@ -1459,10 +1447,9 @@
           </a:lstStyle>
           <a:p>
             <a:r>
-              <a:rPr lang="en-US" smtClean="0"/>
+              <a:rPr lang="en-US"/>
               <a:t>Click to edit Master title style</a:t>
             </a:r>
-            <a:endParaRPr lang="en-US"/>
           </a:p>
         </p:txBody>
       </p:sp>
@@ -1525,7 +1512,7 @@
           <a:p>
             <a:pPr lvl="0"/>
             <a:r>
-              <a:rPr lang="en-US" smtClean="0"/>
+              <a:rPr lang="en-US"/>
               <a:t>Click to edit Master text styles</a:t>
             </a:r>
           </a:p>
@@ -1581,38 +1568,37 @@
           <a:p>
             <a:pPr lvl="0"/>
             <a:r>
-              <a:rPr lang="en-US" smtClean="0"/>
+              <a:rPr lang="en-US"/>
               <a:t>Click to edit Master text styles</a:t>
             </a:r>
           </a:p>
           <a:p>
             <a:pPr lvl="1"/>
             <a:r>
-              <a:rPr lang="en-US" smtClean="0"/>
+              <a:rPr lang="en-US"/>
               <a:t>Second level</a:t>
             </a:r>
           </a:p>
           <a:p>
             <a:pPr lvl="2"/>
             <a:r>
-              <a:rPr lang="en-US" smtClean="0"/>
+              <a:rPr lang="en-US"/>
               <a:t>Third level</a:t>
             </a:r>
           </a:p>
           <a:p>
             <a:pPr lvl="3"/>
             <a:r>
-              <a:rPr lang="en-US" smtClean="0"/>
+              <a:rPr lang="en-US"/>
               <a:t>Fourth level</a:t>
             </a:r>
           </a:p>
           <a:p>
             <a:pPr lvl="4"/>
             <a:r>
-              <a:rPr lang="en-US" smtClean="0"/>
+              <a:rPr lang="en-US"/>
               <a:t>Fifth level</a:t>
             </a:r>
-            <a:endParaRPr lang="en-US"/>
           </a:p>
         </p:txBody>
       </p:sp>
@@ -1675,7 +1661,7 @@
           <a:p>
             <a:pPr lvl="0"/>
             <a:r>
-              <a:rPr lang="en-US" smtClean="0"/>
+              <a:rPr lang="en-US"/>
               <a:t>Click to edit Master text styles</a:t>
             </a:r>
           </a:p>
@@ -1731,38 +1717,37 @@
           <a:p>
             <a:pPr lvl="0"/>
             <a:r>
-              <a:rPr lang="en-US" smtClean="0"/>
+              <a:rPr lang="en-US"/>
               <a:t>Click to edit Master text styles</a:t>
             </a:r>
           </a:p>
           <a:p>
             <a:pPr lvl="1"/>
             <a:r>
-              <a:rPr lang="en-US" smtClean="0"/>
+              <a:rPr lang="en-US"/>
               <a:t>Second level</a:t>
             </a:r>
           </a:p>
           <a:p>
             <a:pPr lvl="2"/>
             <a:r>
-              <a:rPr lang="en-US" smtClean="0"/>
+              <a:rPr lang="en-US"/>
               <a:t>Third level</a:t>
             </a:r>
           </a:p>
           <a:p>
             <a:pPr lvl="3"/>
             <a:r>
-              <a:rPr lang="en-US" smtClean="0"/>
+              <a:rPr lang="en-US"/>
               <a:t>Fourth level</a:t>
             </a:r>
           </a:p>
           <a:p>
             <a:pPr lvl="4"/>
             <a:r>
-              <a:rPr lang="en-US" smtClean="0"/>
+              <a:rPr lang="en-US"/>
               <a:t>Fifth level</a:t>
             </a:r>
-            <a:endParaRPr lang="en-US"/>
           </a:p>
         </p:txBody>
       </p:sp>
@@ -1783,7 +1768,7 @@
           <a:p>
             <a:fld id="{78C97017-6FC3-485B-9764-EAC9E56C1D49}" type="datetimeFigureOut">
               <a:rPr lang="en-US" smtClean="0"/>
-              <a:t>8/31/2017</a:t>
+              <a:t>8/7/2018</a:t>
             </a:fld>
             <a:endParaRPr lang="en-US"/>
           </a:p>
@@ -1877,10 +1862,9 @@
           <a:lstStyle/>
           <a:p>
             <a:r>
-              <a:rPr lang="en-US" smtClean="0"/>
+              <a:rPr lang="en-US"/>
               <a:t>Click to edit Master title style</a:t>
             </a:r>
-            <a:endParaRPr lang="en-US"/>
           </a:p>
         </p:txBody>
       </p:sp>
@@ -1901,7 +1885,7 @@
           <a:p>
             <a:fld id="{78C97017-6FC3-485B-9764-EAC9E56C1D49}" type="datetimeFigureOut">
               <a:rPr lang="en-US" smtClean="0"/>
-              <a:t>8/31/2017</a:t>
+              <a:t>8/7/2018</a:t>
             </a:fld>
             <a:endParaRPr lang="en-US"/>
           </a:p>
@@ -1996,7 +1980,7 @@
           <a:p>
             <a:fld id="{78C97017-6FC3-485B-9764-EAC9E56C1D49}" type="datetimeFigureOut">
               <a:rPr lang="en-US" smtClean="0"/>
-              <a:t>8/31/2017</a:t>
+              <a:t>8/7/2018</a:t>
             </a:fld>
             <a:endParaRPr lang="en-US"/>
           </a:p>
@@ -2099,10 +2083,9 @@
           </a:lstStyle>
           <a:p>
             <a:r>
-              <a:rPr lang="en-US" smtClean="0"/>
+              <a:rPr lang="en-US"/>
               <a:t>Click to edit Master title style</a:t>
             </a:r>
-            <a:endParaRPr lang="en-US"/>
           </a:p>
         </p:txBody>
       </p:sp>
@@ -2156,38 +2139,37 @@
           <a:p>
             <a:pPr lvl="0"/>
             <a:r>
-              <a:rPr lang="en-US" smtClean="0"/>
+              <a:rPr lang="en-US"/>
               <a:t>Click to edit Master text styles</a:t>
             </a:r>
           </a:p>
           <a:p>
             <a:pPr lvl="1"/>
             <a:r>
-              <a:rPr lang="en-US" smtClean="0"/>
+              <a:rPr lang="en-US"/>
               <a:t>Second level</a:t>
             </a:r>
           </a:p>
           <a:p>
             <a:pPr lvl="2"/>
             <a:r>
-              <a:rPr lang="en-US" smtClean="0"/>
+              <a:rPr lang="en-US"/>
               <a:t>Third level</a:t>
             </a:r>
           </a:p>
           <a:p>
             <a:pPr lvl="3"/>
             <a:r>
-              <a:rPr lang="en-US" smtClean="0"/>
+              <a:rPr lang="en-US"/>
               <a:t>Fourth level</a:t>
             </a:r>
           </a:p>
           <a:p>
             <a:pPr lvl="4"/>
             <a:r>
-              <a:rPr lang="en-US" smtClean="0"/>
+              <a:rPr lang="en-US"/>
               <a:t>Fifth level</a:t>
             </a:r>
-            <a:endParaRPr lang="en-US"/>
           </a:p>
         </p:txBody>
       </p:sp>
@@ -2250,7 +2232,7 @@
           <a:p>
             <a:pPr lvl="0"/>
             <a:r>
-              <a:rPr lang="en-US" smtClean="0"/>
+              <a:rPr lang="en-US"/>
               <a:t>Click to edit Master text styles</a:t>
             </a:r>
           </a:p>
@@ -2273,7 +2255,7 @@
           <a:p>
             <a:fld id="{78C97017-6FC3-485B-9764-EAC9E56C1D49}" type="datetimeFigureOut">
               <a:rPr lang="en-US" smtClean="0"/>
-              <a:t>8/31/2017</a:t>
+              <a:t>8/7/2018</a:t>
             </a:fld>
             <a:endParaRPr lang="en-US"/>
           </a:p>
@@ -2376,10 +2358,9 @@
           </a:lstStyle>
           <a:p>
             <a:r>
-              <a:rPr lang="en-US" smtClean="0"/>
+              <a:rPr lang="en-US"/>
               <a:t>Click to edit Master title style</a:t>
             </a:r>
-            <a:endParaRPr lang="en-US"/>
           </a:p>
         </p:txBody>
       </p:sp>
@@ -2503,7 +2484,7 @@
           <a:p>
             <a:pPr lvl="0"/>
             <a:r>
-              <a:rPr lang="en-US" smtClean="0"/>
+              <a:rPr lang="en-US"/>
               <a:t>Click to edit Master text styles</a:t>
             </a:r>
           </a:p>
@@ -2526,7 +2507,7 @@
           <a:p>
             <a:fld id="{78C97017-6FC3-485B-9764-EAC9E56C1D49}" type="datetimeFigureOut">
               <a:rPr lang="en-US" smtClean="0"/>
-              <a:t>8/31/2017</a:t>
+              <a:t>8/7/2018</a:t>
             </a:fld>
             <a:endParaRPr lang="en-US"/>
           </a:p>
@@ -2635,10 +2616,9 @@
           <a:lstStyle/>
           <a:p>
             <a:r>
-              <a:rPr lang="en-US" smtClean="0"/>
+              <a:rPr lang="en-US"/>
               <a:t>Click to edit Master title style</a:t>
             </a:r>
-            <a:endParaRPr lang="en-US"/>
           </a:p>
         </p:txBody>
       </p:sp>
@@ -2669,38 +2649,37 @@
           <a:p>
             <a:pPr lvl="0"/>
             <a:r>
-              <a:rPr lang="en-US" smtClean="0"/>
+              <a:rPr lang="en-US"/>
               <a:t>Click to edit Master text styles</a:t>
             </a:r>
           </a:p>
           <a:p>
             <a:pPr lvl="1"/>
             <a:r>
-              <a:rPr lang="en-US" smtClean="0"/>
+              <a:rPr lang="en-US"/>
               <a:t>Second level</a:t>
             </a:r>
           </a:p>
           <a:p>
             <a:pPr lvl="2"/>
             <a:r>
-              <a:rPr lang="en-US" smtClean="0"/>
+              <a:rPr lang="en-US"/>
               <a:t>Third level</a:t>
             </a:r>
           </a:p>
           <a:p>
             <a:pPr lvl="3"/>
             <a:r>
-              <a:rPr lang="en-US" smtClean="0"/>
+              <a:rPr lang="en-US"/>
               <a:t>Fourth level</a:t>
             </a:r>
           </a:p>
           <a:p>
             <a:pPr lvl="4"/>
             <a:r>
-              <a:rPr lang="en-US" smtClean="0"/>
+              <a:rPr lang="en-US"/>
               <a:t>Fifth level</a:t>
             </a:r>
-            <a:endParaRPr lang="en-US"/>
           </a:p>
         </p:txBody>
       </p:sp>
@@ -2739,7 +2718,7 @@
           <a:p>
             <a:fld id="{78C97017-6FC3-485B-9764-EAC9E56C1D49}" type="datetimeFigureOut">
               <a:rPr lang="en-US" smtClean="0"/>
-              <a:t>8/31/2017</a:t>
+              <a:t>8/7/2018</a:t>
             </a:fld>
             <a:endParaRPr lang="en-US"/>
           </a:p>
@@ -3130,14 +3109,13 @@
           <a:lstStyle/>
           <a:p>
             <a:r>
-              <a:rPr lang="en-US" dirty="0" err="1" smtClean="0"/>
+              <a:rPr lang="en-US" dirty="0" err="1"/>
               <a:t>AddressBook</a:t>
             </a:r>
             <a:r>
-              <a:rPr lang="en-US" dirty="0" smtClean="0"/>
+              <a:rPr lang="en-US" dirty="0"/>
               <a:t> – Level 2</a:t>
             </a:r>
-            <a:endParaRPr lang="en-US" dirty="0"/>
           </a:p>
         </p:txBody>
       </p:sp>
@@ -3157,10 +3135,9 @@
           <a:lstStyle/>
           <a:p>
             <a:r>
-              <a:rPr lang="en-US" dirty="0" smtClean="0"/>
+              <a:rPr lang="en-US" dirty="0"/>
               <a:t>Diagrams</a:t>
             </a:r>
-            <a:endParaRPr lang="en-US" dirty="0"/>
           </a:p>
         </p:txBody>
       </p:sp>
@@ -3231,7 +3208,7 @@
           <a:p>
             <a:pPr algn="ctr"/>
             <a:r>
-              <a:rPr lang="en-US" sz="1050" dirty="0" err="1" smtClean="0"/>
+              <a:rPr lang="en-US" sz="1050" dirty="0" err="1"/>
               <a:t>TextUi</a:t>
             </a:r>
             <a:endParaRPr lang="en-SG" sz="1050" dirty="0"/>
@@ -3282,7 +3259,7 @@
           <a:p>
             <a:pPr algn="ctr"/>
             <a:r>
-              <a:rPr lang="en-US" sz="1050" dirty="0" smtClean="0">
+              <a:rPr lang="en-US" sz="1050" dirty="0">
                 <a:solidFill>
                   <a:schemeClr val="bg1"/>
                 </a:solidFill>
@@ -3378,59 +3355,8 @@
           <a:p>
             <a:pPr algn="ctr"/>
             <a:r>
-              <a:rPr lang="en-US" sz="1050" dirty="0" smtClean="0"/>
+              <a:rPr lang="en-US" sz="1050" dirty="0"/>
               <a:t>Parser</a:t>
-            </a:r>
-            <a:endParaRPr lang="en-SG" sz="1050" dirty="0"/>
-          </a:p>
-        </p:txBody>
-      </p:sp>
-      <p:sp>
-        <p:nvSpPr>
-          <p:cNvPr id="15" name="Rectangle 14"/>
-          <p:cNvSpPr/>
-          <p:nvPr/>
-        </p:nvSpPr>
-        <p:spPr>
-          <a:xfrm>
-            <a:off x="3681046" y="3032560"/>
-            <a:ext cx="929296" cy="346760"/>
-          </a:xfrm>
-          <a:prstGeom prst="rect">
-            <a:avLst/>
-          </a:prstGeom>
-          <a:ln w="19050"/>
-          <a:effectLst/>
-        </p:spPr>
-        <p:style>
-          <a:lnRef idx="1">
-            <a:schemeClr val="accent6"/>
-          </a:lnRef>
-          <a:fillRef idx="2">
-            <a:schemeClr val="accent6"/>
-          </a:fillRef>
-          <a:effectRef idx="1">
-            <a:schemeClr val="accent6"/>
-          </a:effectRef>
-          <a:fontRef idx="minor">
-            <a:schemeClr val="dk1"/>
-          </a:fontRef>
-        </p:style>
-        <p:txBody>
-          <a:bodyPr rtlCol="0" anchor="ctr"/>
-          <a:lstStyle/>
-          <a:p>
-            <a:pPr algn="ctr"/>
-            <a:r>
-              <a:rPr lang="en-US" sz="1050" dirty="0" smtClean="0"/>
-              <a:t>Unique</a:t>
-            </a:r>
-            <a:br>
-              <a:rPr lang="en-US" sz="1050" dirty="0" smtClean="0"/>
-            </a:br>
-            <a:r>
-              <a:rPr lang="en-US" sz="1050" dirty="0" err="1" smtClean="0"/>
-              <a:t>TagList</a:t>
             </a:r>
             <a:endParaRPr lang="en-SG" sz="1050" dirty="0"/>
           </a:p>
@@ -3444,7 +3370,7 @@
         </p:nvSpPr>
         <p:spPr>
           <a:xfrm>
-            <a:off x="3654669" y="4352685"/>
+            <a:off x="3811764" y="3747060"/>
             <a:ext cx="929296" cy="346760"/>
           </a:xfrm>
           <a:prstGeom prst="rect">
@@ -3473,14 +3399,14 @@
           <a:p>
             <a:pPr algn="ctr"/>
             <a:r>
-              <a:rPr lang="en-US" sz="1050" dirty="0" smtClean="0"/>
+              <a:rPr lang="en-US" sz="1050" dirty="0"/>
               <a:t>Unique</a:t>
             </a:r>
             <a:br>
-              <a:rPr lang="en-US" sz="1050" dirty="0" smtClean="0"/>
+              <a:rPr lang="en-US" sz="1050" dirty="0"/>
             </a:br>
             <a:r>
-              <a:rPr lang="en-US" sz="1050" dirty="0" err="1" smtClean="0"/>
+              <a:rPr lang="en-US" sz="1050" dirty="0" err="1"/>
               <a:t>PersonList</a:t>
             </a:r>
             <a:endParaRPr lang="en-SG" sz="1050" dirty="0"/>
@@ -3495,7 +3421,7 @@
         </p:nvSpPr>
         <p:spPr>
           <a:xfrm>
-            <a:off x="5219458" y="4352685"/>
+            <a:off x="5225899" y="3747060"/>
             <a:ext cx="929296" cy="346760"/>
           </a:xfrm>
           <a:prstGeom prst="rect">
@@ -3524,7 +3450,7 @@
           <a:p>
             <a:pPr algn="ctr"/>
             <a:r>
-              <a:rPr lang="en-US" sz="1050" dirty="0" smtClean="0"/>
+              <a:rPr lang="en-US" sz="1050" dirty="0"/>
               <a:t>Person</a:t>
             </a:r>
             <a:endParaRPr lang="en-SG" sz="1050" dirty="0"/>
@@ -3568,7 +3494,7 @@
           <a:p>
             <a:pPr algn="ctr"/>
             <a:r>
-              <a:rPr lang="en-US" sz="1050" dirty="0" smtClean="0"/>
+              <a:rPr lang="en-US" sz="1050" dirty="0"/>
               <a:t>Phone</a:t>
             </a:r>
             <a:endParaRPr lang="en-SG" sz="1050" dirty="0"/>
@@ -3612,7 +3538,7 @@
           <a:p>
             <a:pPr algn="ctr"/>
             <a:r>
-              <a:rPr lang="en-US" sz="1050" dirty="0" smtClean="0"/>
+              <a:rPr lang="en-US" sz="1050" dirty="0"/>
               <a:t>Email</a:t>
             </a:r>
             <a:endParaRPr lang="en-SG" sz="1050" dirty="0"/>
@@ -3656,7 +3582,7 @@
           <a:p>
             <a:pPr algn="ctr"/>
             <a:r>
-              <a:rPr lang="en-US" sz="1050" dirty="0" smtClean="0"/>
+              <a:rPr lang="en-US" sz="1050" dirty="0"/>
               <a:t>Address</a:t>
             </a:r>
             <a:endParaRPr lang="en-SG" sz="1050" dirty="0"/>
@@ -3700,7 +3626,7 @@
           <a:p>
             <a:pPr algn="ctr"/>
             <a:r>
-              <a:rPr lang="en-US" sz="1050" dirty="0" err="1" smtClean="0"/>
+              <a:rPr lang="en-US" sz="1050" dirty="0" err="1"/>
               <a:t>StorageFile</a:t>
             </a:r>
             <a:endParaRPr lang="en-SG" sz="1050" dirty="0"/>
@@ -3831,44 +3757,7 @@
         <p:nvCxnSpPr>
           <p:cNvPr id="48" name="Elbow Connector 47"/>
           <p:cNvCxnSpPr>
-            <a:stCxn id="106" idx="3"/>
-            <a:endCxn id="15" idx="1"/>
-          </p:cNvCxnSpPr>
-          <p:nvPr/>
-        </p:nvCxnSpPr>
-        <p:spPr>
-          <a:xfrm flipV="1">
-            <a:off x="3230192" y="3205940"/>
-            <a:ext cx="450854" cy="712546"/>
-          </a:xfrm>
-          <a:prstGeom prst="bentConnector3">
-            <a:avLst/>
-          </a:prstGeom>
-          <a:ln w="19050">
-            <a:headEnd type="none" w="med" len="med"/>
-            <a:tailEnd type="arrow" w="med" len="med"/>
-          </a:ln>
-          <a:effectLst/>
-        </p:spPr>
-        <p:style>
-          <a:lnRef idx="1">
-            <a:schemeClr val="accent6"/>
-          </a:lnRef>
-          <a:fillRef idx="2">
-            <a:schemeClr val="accent6"/>
-          </a:fillRef>
-          <a:effectRef idx="1">
-            <a:schemeClr val="accent6"/>
-          </a:effectRef>
-          <a:fontRef idx="minor">
-            <a:schemeClr val="dk1"/>
-          </a:fontRef>
-        </p:style>
-      </p:cxnSp>
-      <p:cxnSp>
-        <p:nvCxnSpPr>
-          <p:cNvPr id="51" name="Elbow Connector 50"/>
-          <p:cNvCxnSpPr>
+            <a:cxnSpLocks/>
             <a:stCxn id="106" idx="3"/>
             <a:endCxn id="16" idx="1"/>
           </p:cNvCxnSpPr>
@@ -3877,52 +3766,10 @@
         <p:spPr>
           <a:xfrm>
             <a:off x="3230192" y="3918486"/>
-            <a:ext cx="424477" cy="607579"/>
+            <a:ext cx="581572" cy="1954"/>
           </a:xfrm>
           <a:prstGeom prst="bentConnector3">
-            <a:avLst>
-              <a:gd name="adj1" fmla="val 52660"/>
-            </a:avLst>
-          </a:prstGeom>
-          <a:ln w="19050">
-            <a:headEnd type="none" w="med" len="med"/>
-            <a:tailEnd type="arrow" w="med" len="med"/>
-          </a:ln>
-          <a:effectLst/>
-        </p:spPr>
-        <p:style>
-          <a:lnRef idx="1">
-            <a:schemeClr val="accent6"/>
-          </a:lnRef>
-          <a:fillRef idx="2">
-            <a:schemeClr val="accent6"/>
-          </a:fillRef>
-          <a:effectRef idx="1">
-            <a:schemeClr val="accent6"/>
-          </a:effectRef>
-          <a:fontRef idx="minor">
-            <a:schemeClr val="dk1"/>
-          </a:fontRef>
-        </p:style>
-      </p:cxnSp>
-      <p:cxnSp>
-        <p:nvCxnSpPr>
-          <p:cNvPr id="62" name="Elbow Connector 61"/>
-          <p:cNvCxnSpPr>
-            <a:stCxn id="19" idx="0"/>
-            <a:endCxn id="79" idx="2"/>
-          </p:cNvCxnSpPr>
-          <p:nvPr/>
-        </p:nvCxnSpPr>
-        <p:spPr>
-          <a:xfrm rot="5400000" flipH="1" flipV="1">
-            <a:off x="5197424" y="3866003"/>
-            <a:ext cx="973365" cy="12700"/>
-          </a:xfrm>
-          <a:prstGeom prst="bentConnector3">
-            <a:avLst>
-              <a:gd name="adj1" fmla="val 50000"/>
-            </a:avLst>
+            <a:avLst/>
           </a:prstGeom>
           <a:ln w="19050">
             <a:headEnd type="none" w="med" len="med"/>
@@ -3955,9 +3802,9 @@
           <p:nvPr/>
         </p:nvCxnSpPr>
         <p:spPr>
-          <a:xfrm flipV="1">
-            <a:off x="6384802" y="4209657"/>
-            <a:ext cx="396998" cy="312434"/>
+          <a:xfrm>
+            <a:off x="6398691" y="3972890"/>
+            <a:ext cx="383109" cy="236767"/>
           </a:xfrm>
           <a:prstGeom prst="bentConnector3">
             <a:avLst>
@@ -3996,8 +3843,8 @@
         </p:nvCxnSpPr>
         <p:spPr>
           <a:xfrm>
-            <a:off x="6384802" y="4522091"/>
-            <a:ext cx="411652" cy="147089"/>
+            <a:off x="6398691" y="3972890"/>
+            <a:ext cx="397763" cy="696290"/>
           </a:xfrm>
           <a:prstGeom prst="bentConnector3">
             <a:avLst>
@@ -4036,8 +3883,8 @@
         </p:nvCxnSpPr>
         <p:spPr>
           <a:xfrm>
-            <a:off x="6384802" y="4522091"/>
-            <a:ext cx="411652" cy="604289"/>
+            <a:off x="6398691" y="3972890"/>
+            <a:ext cx="397763" cy="1153490"/>
           </a:xfrm>
           <a:prstGeom prst="bentConnector3">
             <a:avLst>
@@ -4067,57 +3914,13 @@
       </p:cxnSp>
       <p:sp>
         <p:nvSpPr>
-          <p:cNvPr id="79" name="Rectangle 78"/>
-          <p:cNvSpPr/>
-          <p:nvPr/>
-        </p:nvSpPr>
-        <p:spPr>
-          <a:xfrm>
-            <a:off x="5219458" y="3032560"/>
-            <a:ext cx="929296" cy="346760"/>
-          </a:xfrm>
-          <a:prstGeom prst="rect">
-            <a:avLst/>
-          </a:prstGeom>
-          <a:ln w="19050"/>
-          <a:effectLst/>
-        </p:spPr>
-        <p:style>
-          <a:lnRef idx="1">
-            <a:schemeClr val="accent6"/>
-          </a:lnRef>
-          <a:fillRef idx="2">
-            <a:schemeClr val="accent6"/>
-          </a:fillRef>
-          <a:effectRef idx="1">
-            <a:schemeClr val="accent6"/>
-          </a:effectRef>
-          <a:fontRef idx="minor">
-            <a:schemeClr val="dk1"/>
-          </a:fontRef>
-        </p:style>
-        <p:txBody>
-          <a:bodyPr rtlCol="0" anchor="ctr"/>
-          <a:lstStyle/>
-          <a:p>
-            <a:pPr algn="ctr"/>
-            <a:r>
-              <a:rPr lang="en-US" sz="1050" dirty="0"/>
-              <a:t>Tag</a:t>
-            </a:r>
-            <a:endParaRPr lang="en-SG" sz="1050" dirty="0"/>
-          </a:p>
-        </p:txBody>
-      </p:sp>
-      <p:sp>
-        <p:nvSpPr>
           <p:cNvPr id="90" name="Flowchart: Decision 89"/>
           <p:cNvSpPr/>
           <p:nvPr/>
         </p:nvSpPr>
         <p:spPr>
           <a:xfrm>
-            <a:off x="6148754" y="4435401"/>
+            <a:off x="6162643" y="3886200"/>
             <a:ext cx="236048" cy="173380"/>
           </a:xfrm>
           <a:prstGeom prst="flowChartDecision">
@@ -4158,13 +3961,13 @@
       </p:sp>
       <p:sp>
         <p:nvSpPr>
-          <p:cNvPr id="97" name="Flowchart: Decision 96"/>
+          <p:cNvPr id="100" name="Flowchart: Decision 99"/>
           <p:cNvSpPr/>
           <p:nvPr/>
         </p:nvSpPr>
         <p:spPr>
           <a:xfrm>
-            <a:off x="4610342" y="3131950"/>
+            <a:off x="4741060" y="3833750"/>
             <a:ext cx="236048" cy="173380"/>
           </a:xfrm>
           <a:prstGeom prst="flowChartDecision">
@@ -4199,19 +4002,21 @@
       </p:sp>
       <p:sp>
         <p:nvSpPr>
-          <p:cNvPr id="100" name="Flowchart: Decision 99"/>
+          <p:cNvPr id="106" name="Flowchart: Decision 105"/>
           <p:cNvSpPr/>
           <p:nvPr/>
         </p:nvSpPr>
         <p:spPr>
           <a:xfrm>
-            <a:off x="4573941" y="4439375"/>
+            <a:off x="2994144" y="3831796"/>
             <a:ext cx="236048" cy="173380"/>
           </a:xfrm>
           <a:prstGeom prst="flowChartDecision">
             <a:avLst/>
           </a:prstGeom>
-          <a:noFill/>
+          <a:solidFill>
+            <a:schemeClr val="accent6"/>
+          </a:solidFill>
           <a:ln w="19050"/>
           <a:effectLst/>
         </p:spPr>
@@ -4238,87 +4043,6 @@
           </a:p>
         </p:txBody>
       </p:sp>
-      <p:sp>
-        <p:nvSpPr>
-          <p:cNvPr id="106" name="Flowchart: Decision 105"/>
-          <p:cNvSpPr/>
-          <p:nvPr/>
-        </p:nvSpPr>
-        <p:spPr>
-          <a:xfrm>
-            <a:off x="2994144" y="3831796"/>
-            <a:ext cx="236048" cy="173380"/>
-          </a:xfrm>
-          <a:prstGeom prst="flowChartDecision">
-            <a:avLst/>
-          </a:prstGeom>
-          <a:solidFill>
-            <a:schemeClr val="accent6"/>
-          </a:solidFill>
-          <a:ln w="19050"/>
-          <a:effectLst/>
-        </p:spPr>
-        <p:style>
-          <a:lnRef idx="1">
-            <a:schemeClr val="accent6"/>
-          </a:lnRef>
-          <a:fillRef idx="2">
-            <a:schemeClr val="accent6"/>
-          </a:fillRef>
-          <a:effectRef idx="1">
-            <a:schemeClr val="accent6"/>
-          </a:effectRef>
-          <a:fontRef idx="minor">
-            <a:schemeClr val="dk1"/>
-          </a:fontRef>
-        </p:style>
-        <p:txBody>
-          <a:bodyPr rtlCol="0" anchor="ctr"/>
-          <a:lstStyle/>
-          <a:p>
-            <a:pPr algn="ctr"/>
-            <a:endParaRPr lang="en-US" sz="1050"/>
-          </a:p>
-        </p:txBody>
-      </p:sp>
-      <p:cxnSp>
-        <p:nvCxnSpPr>
-          <p:cNvPr id="114" name="Straight Arrow Connector 113"/>
-          <p:cNvCxnSpPr>
-            <a:stCxn id="97" idx="3"/>
-            <a:endCxn id="79" idx="1"/>
-          </p:cNvCxnSpPr>
-          <p:nvPr/>
-        </p:nvCxnSpPr>
-        <p:spPr>
-          <a:xfrm flipV="1">
-            <a:off x="4846390" y="3205940"/>
-            <a:ext cx="373068" cy="12700"/>
-          </a:xfrm>
-          <a:prstGeom prst="straightConnector1">
-            <a:avLst/>
-          </a:prstGeom>
-          <a:ln w="19050">
-            <a:headEnd type="none" w="med" len="med"/>
-            <a:tailEnd type="arrow" w="med" len="med"/>
-          </a:ln>
-          <a:effectLst/>
-        </p:spPr>
-        <p:style>
-          <a:lnRef idx="1">
-            <a:schemeClr val="accent6"/>
-          </a:lnRef>
-          <a:fillRef idx="2">
-            <a:schemeClr val="accent6"/>
-          </a:fillRef>
-          <a:effectRef idx="1">
-            <a:schemeClr val="accent6"/>
-          </a:effectRef>
-          <a:fontRef idx="minor">
-            <a:schemeClr val="dk1"/>
-          </a:fontRef>
-        </p:style>
-      </p:cxnSp>
       <p:cxnSp>
         <p:nvCxnSpPr>
           <p:cNvPr id="115" name="Straight Arrow Connector 114"/>
@@ -4330,8 +4054,8 @@
         </p:nvCxnSpPr>
         <p:spPr>
           <a:xfrm>
-            <a:off x="4809989" y="4526065"/>
-            <a:ext cx="409469" cy="0"/>
+            <a:off x="4977108" y="3920440"/>
+            <a:ext cx="248791" cy="0"/>
           </a:xfrm>
           <a:prstGeom prst="straightConnector1">
             <a:avLst/>
@@ -4435,14 +4159,14 @@
           <a:p>
             <a:pPr algn="ctr"/>
             <a:r>
-              <a:rPr lang="en-US" sz="1050" dirty="0" smtClean="0"/>
+              <a:rPr lang="en-US" sz="1050" dirty="0"/>
               <a:t>&lt;&lt;interface&gt;&gt;</a:t>
             </a:r>
           </a:p>
           <a:p>
             <a:pPr algn="ctr"/>
             <a:r>
-              <a:rPr lang="en-US" sz="1050" dirty="0" err="1" smtClean="0"/>
+              <a:rPr lang="en-US" sz="1050" dirty="0" err="1"/>
               <a:t>ReadOnlyPerson</a:t>
             </a:r>
             <a:endParaRPr lang="en-SG" sz="1050" dirty="0"/>
@@ -4544,8 +4268,8 @@
         </p:nvCxnSpPr>
         <p:spPr>
           <a:xfrm rot="5400000">
-            <a:off x="4456082" y="4085763"/>
-            <a:ext cx="614343" cy="1841706"/>
+            <a:off x="4156490" y="3779731"/>
+            <a:ext cx="1219968" cy="1848147"/>
           </a:xfrm>
           <a:prstGeom prst="bentConnector2">
             <a:avLst/>
@@ -4609,7 +4333,7 @@
           <a:p>
             <a:pPr algn="ctr"/>
             <a:r>
-              <a:rPr lang="en-US" sz="1050" dirty="0" smtClean="0"/>
+              <a:rPr lang="en-US" sz="1050" dirty="0"/>
               <a:t>Command</a:t>
             </a:r>
             <a:endParaRPr lang="en-SG" sz="1050" dirty="0"/>
@@ -4939,7 +4663,7 @@
           <a:p>
             <a:pPr algn="ctr"/>
             <a:r>
-              <a:rPr lang="en-US" sz="1050" dirty="0" smtClean="0"/>
+              <a:rPr lang="en-US" sz="1050" dirty="0"/>
               <a:t>…Command</a:t>
             </a:r>
             <a:endParaRPr lang="en-SG" sz="1050" dirty="0"/>
@@ -5287,8 +5011,8 @@
         </p:nvCxnSpPr>
         <p:spPr>
           <a:xfrm flipV="1">
-            <a:off x="6384802" y="3712820"/>
-            <a:ext cx="396998" cy="809271"/>
+            <a:off x="6398691" y="3712820"/>
+            <a:ext cx="383109" cy="260070"/>
           </a:xfrm>
           <a:prstGeom prst="bentConnector3">
             <a:avLst>
@@ -5353,7 +5077,7 @@
           <a:p>
             <a:pPr algn="ctr"/>
             <a:r>
-              <a:rPr lang="en-US" sz="1050" dirty="0" smtClean="0"/>
+              <a:rPr lang="en-US" sz="1050" dirty="0"/>
               <a:t>Messages</a:t>
             </a:r>
             <a:endParaRPr lang="en-SG" sz="1050" dirty="0"/>
@@ -5397,7 +5121,7 @@
           <a:p>
             <a:pPr algn="ctr"/>
             <a:r>
-              <a:rPr lang="en-US" sz="1050" dirty="0" err="1" smtClean="0"/>
+              <a:rPr lang="en-US" sz="1050" dirty="0" err="1"/>
               <a:t>Utils</a:t>
             </a:r>
             <a:endParaRPr lang="en-SG" sz="1050" dirty="0"/>
@@ -5412,7 +5136,7 @@
         </p:nvSpPr>
         <p:spPr>
           <a:xfrm>
-            <a:off x="3666876" y="3710497"/>
+            <a:off x="3825515" y="3038895"/>
             <a:ext cx="929296" cy="346760"/>
           </a:xfrm>
           <a:prstGeom prst="rect">
@@ -5485,7 +5209,7 @@
           <a:p>
             <a:pPr algn="ctr"/>
             <a:r>
-              <a:rPr lang="en-US" sz="1050" dirty="0" smtClean="0"/>
+              <a:rPr lang="en-US" sz="1050" dirty="0"/>
               <a:t>Adapted…</a:t>
             </a:r>
             <a:endParaRPr lang="en-SG" sz="1050" dirty="0"/>
@@ -5770,6 +5494,141 @@
           </a:fontRef>
         </p:style>
       </p:cxnSp>
+      <p:sp>
+        <p:nvSpPr>
+          <p:cNvPr id="78" name="TextBox 77">
+            <a:extLst>
+              <a:ext uri="{FF2B5EF4-FFF2-40B4-BE49-F238E27FC236}">
+                <a16:creationId xmlns:a16="http://schemas.microsoft.com/office/drawing/2014/main" id="{7ECB0176-8EE8-4192-85B7-40A3891AEA21}"/>
+              </a:ext>
+            </a:extLst>
+          </p:cNvPr>
+          <p:cNvSpPr txBox="1"/>
+          <p:nvPr/>
+        </p:nvSpPr>
+        <p:spPr>
+          <a:xfrm>
+            <a:off x="6553456" y="2866496"/>
+            <a:ext cx="88232" cy="369332"/>
+          </a:xfrm>
+          <a:prstGeom prst="rect">
+            <a:avLst/>
+          </a:prstGeom>
+          <a:noFill/>
+        </p:spPr>
+        <p:txBody>
+          <a:bodyPr wrap="square" rtlCol="0">
+            <a:spAutoFit/>
+          </a:bodyPr>
+          <a:lstStyle/>
+          <a:p>
+            <a:r>
+              <a:rPr lang="en-US" dirty="0">
+                <a:solidFill>
+                  <a:schemeClr val="accent6">
+                    <a:lumMod val="75000"/>
+                  </a:schemeClr>
+                </a:solidFill>
+              </a:rPr>
+              <a:t>*</a:t>
+            </a:r>
+          </a:p>
+        </p:txBody>
+      </p:sp>
+      <p:cxnSp>
+        <p:nvCxnSpPr>
+          <p:cNvPr id="61" name="Elbow Connector 92">
+            <a:extLst>
+              <a:ext uri="{FF2B5EF4-FFF2-40B4-BE49-F238E27FC236}">
+                <a16:creationId xmlns:a16="http://schemas.microsoft.com/office/drawing/2014/main" id="{69AFBE68-00A9-433D-8882-F849D6F6765E}"/>
+              </a:ext>
+            </a:extLst>
+          </p:cNvPr>
+          <p:cNvCxnSpPr>
+            <a:cxnSpLocks/>
+            <a:endCxn id="64" idx="1"/>
+          </p:cNvCxnSpPr>
+          <p:nvPr/>
+        </p:nvCxnSpPr>
+        <p:spPr>
+          <a:xfrm rot="5400000" flipH="1" flipV="1">
+            <a:off x="6290246" y="3483113"/>
+            <a:ext cx="787422" cy="183591"/>
+          </a:xfrm>
+          <a:prstGeom prst="bentConnector2">
+            <a:avLst/>
+          </a:prstGeom>
+          <a:ln w="19050">
+            <a:headEnd type="none" w="med" len="med"/>
+            <a:tailEnd type="arrow" w="med" len="med"/>
+          </a:ln>
+          <a:effectLst/>
+        </p:spPr>
+        <p:style>
+          <a:lnRef idx="1">
+            <a:schemeClr val="accent6"/>
+          </a:lnRef>
+          <a:fillRef idx="2">
+            <a:schemeClr val="accent6"/>
+          </a:fillRef>
+          <a:effectRef idx="1">
+            <a:schemeClr val="accent6"/>
+          </a:effectRef>
+          <a:fontRef idx="minor">
+            <a:schemeClr val="dk1"/>
+          </a:fontRef>
+        </p:style>
+      </p:cxnSp>
+      <p:sp>
+        <p:nvSpPr>
+          <p:cNvPr id="64" name="Rectangle 63">
+            <a:extLst>
+              <a:ext uri="{FF2B5EF4-FFF2-40B4-BE49-F238E27FC236}">
+                <a16:creationId xmlns:a16="http://schemas.microsoft.com/office/drawing/2014/main" id="{69672A69-0DC3-4881-B543-9E8CC98C9D17}"/>
+              </a:ext>
+            </a:extLst>
+          </p:cNvPr>
+          <p:cNvSpPr/>
+          <p:nvPr/>
+        </p:nvSpPr>
+        <p:spPr>
+          <a:xfrm>
+            <a:off x="6775753" y="3007817"/>
+            <a:ext cx="929296" cy="346760"/>
+          </a:xfrm>
+          <a:prstGeom prst="rect">
+            <a:avLst/>
+          </a:prstGeom>
+          <a:ln w="19050"/>
+          <a:effectLst/>
+        </p:spPr>
+        <p:style>
+          <a:lnRef idx="1">
+            <a:schemeClr val="accent4"/>
+          </a:lnRef>
+          <a:fillRef idx="2">
+            <a:schemeClr val="accent4"/>
+          </a:fillRef>
+          <a:effectRef idx="1">
+            <a:schemeClr val="accent4"/>
+          </a:effectRef>
+          <a:fontRef idx="minor">
+            <a:schemeClr val="dk1"/>
+          </a:fontRef>
+        </p:style>
+        <p:txBody>
+          <a:bodyPr rtlCol="0" anchor="ctr"/>
+          <a:lstStyle/>
+          <a:p>
+            <a:pPr algn="ctr"/>
+            <a:r>
+              <a:rPr lang="en-US" sz="1050" dirty="0"/>
+              <a:t>Tag</a:t>
+            </a:r>
+            <a:endParaRPr lang="en-SG" sz="1050" dirty="0"/>
+          </a:p>
+        </p:txBody>
+      </p:sp>
     </p:spTree>
     <p:extLst>
       <p:ext uri="{BB962C8B-B14F-4D97-AF65-F5344CB8AC3E}">
@@ -5837,7 +5696,7 @@
           <a:p>
             <a:pPr algn="ctr"/>
             <a:r>
-              <a:rPr lang="en-US" sz="1050" dirty="0" smtClean="0"/>
+              <a:rPr lang="en-US" sz="1050" dirty="0"/>
               <a:t>Address</a:t>
             </a:r>
             <a:endParaRPr lang="en-SG" sz="1050" dirty="0"/>
@@ -5881,7 +5740,7 @@
           <a:p>
             <a:pPr algn="ctr"/>
             <a:r>
-              <a:rPr lang="en-US" sz="1050" dirty="0" smtClean="0"/>
+              <a:rPr lang="en-US" sz="1050" dirty="0"/>
               <a:t>Unit</a:t>
             </a:r>
             <a:endParaRPr lang="en-SG" sz="1050" dirty="0"/>
@@ -6008,7 +5867,7 @@
           <a:p>
             <a:pPr algn="ctr"/>
             <a:r>
-              <a:rPr lang="en-US" sz="1050" dirty="0" smtClean="0"/>
+              <a:rPr lang="en-US" sz="1050" dirty="0"/>
               <a:t>Postal code</a:t>
             </a:r>
             <a:endParaRPr lang="en-SG" sz="1050" dirty="0"/>
@@ -6052,7 +5911,7 @@
           <a:p>
             <a:pPr algn="ctr"/>
             <a:r>
-              <a:rPr lang="en-US" sz="1050" dirty="0" smtClean="0"/>
+              <a:rPr lang="en-US" sz="1050" dirty="0"/>
               <a:t>Street</a:t>
             </a:r>
             <a:endParaRPr lang="en-SG" sz="1050" dirty="0"/>
@@ -6096,7 +5955,7 @@
           <a:p>
             <a:pPr algn="ctr"/>
             <a:r>
-              <a:rPr lang="en-US" sz="1050" dirty="0" smtClean="0"/>
+              <a:rPr lang="en-US" sz="1050" dirty="0"/>
               <a:t>Block</a:t>
             </a:r>
             <a:endParaRPr lang="en-SG" sz="1050" dirty="0"/>
@@ -6260,10 +6119,9 @@
           <a:p>
             <a:pPr algn="ctr"/>
             <a:r>
-              <a:rPr lang="en-SG" sz="1050" dirty="0" smtClean="0"/>
+              <a:rPr lang="en-SG" sz="1050" dirty="0"/>
               <a:t>Contact</a:t>
             </a:r>
-            <a:endParaRPr lang="en-SG" sz="1050" dirty="0"/>
           </a:p>
         </p:txBody>
       </p:sp>
@@ -6304,7 +6162,7 @@
           <a:p>
             <a:pPr algn="ctr"/>
             <a:r>
-              <a:rPr lang="en-US" sz="1050" dirty="0" smtClean="0"/>
+              <a:rPr lang="en-US" sz="1050" dirty="0"/>
               <a:t>Phone</a:t>
             </a:r>
             <a:endParaRPr lang="en-SG" sz="1050" dirty="0"/>
@@ -6348,7 +6206,7 @@
           <a:p>
             <a:pPr algn="ctr"/>
             <a:r>
-              <a:rPr lang="en-US" sz="1050" dirty="0" smtClean="0"/>
+              <a:rPr lang="en-US" sz="1050" dirty="0"/>
               <a:t>Email</a:t>
             </a:r>
             <a:endParaRPr lang="en-SG" sz="1050" dirty="0"/>
@@ -6392,7 +6250,7 @@
           <a:p>
             <a:pPr algn="ctr"/>
             <a:r>
-              <a:rPr lang="en-US" sz="1050" dirty="0" smtClean="0"/>
+              <a:rPr lang="en-US" sz="1050" dirty="0"/>
               <a:t>Address</a:t>
             </a:r>
             <a:endParaRPr lang="en-SG" sz="1050" dirty="0"/>
@@ -6581,10 +6439,9 @@
           <a:p>
             <a:pPr algn="ctr"/>
             <a:r>
-              <a:rPr lang="en-SG" sz="1050" dirty="0" smtClean="0"/>
+              <a:rPr lang="en-SG" sz="1050" dirty="0"/>
               <a:t>&lt;&lt;interface&gt;&gt; Printable</a:t>
             </a:r>
-            <a:endParaRPr lang="en-SG" sz="1050" dirty="0"/>
           </a:p>
         </p:txBody>
       </p:sp>
@@ -6625,7 +6482,7 @@
           <a:p>
             <a:pPr algn="ctr"/>
             <a:r>
-              <a:rPr lang="en-US" sz="1050" dirty="0" smtClean="0"/>
+              <a:rPr lang="en-US" sz="1050" dirty="0"/>
               <a:t>Phone</a:t>
             </a:r>
             <a:endParaRPr lang="en-SG" sz="1050" dirty="0"/>
@@ -6669,7 +6526,7 @@
           <a:p>
             <a:pPr algn="ctr"/>
             <a:r>
-              <a:rPr lang="en-US" sz="1050" dirty="0" smtClean="0"/>
+              <a:rPr lang="en-US" sz="1050" dirty="0"/>
               <a:t>Email</a:t>
             </a:r>
             <a:endParaRPr lang="en-SG" sz="1050" dirty="0"/>
@@ -6713,7 +6570,7 @@
           <a:p>
             <a:pPr algn="ctr"/>
             <a:r>
-              <a:rPr lang="en-US" sz="1050" dirty="0" smtClean="0"/>
+              <a:rPr lang="en-US" sz="1050" dirty="0"/>
               <a:t>Address</a:t>
             </a:r>
             <a:endParaRPr lang="en-SG" sz="1050" dirty="0"/>
@@ -6914,7 +6771,7 @@
           <a:p>
             <a:pPr algn="ctr"/>
             <a:r>
-              <a:rPr lang="en-US" sz="1050" dirty="0" smtClean="0"/>
+              <a:rPr lang="en-US" sz="1050" dirty="0"/>
               <a:t>Name</a:t>
             </a:r>
             <a:endParaRPr lang="en-SG" sz="1050" dirty="0"/>
@@ -7037,15 +6894,15 @@
           <a:p>
             <a:pPr algn="ctr"/>
             <a:r>
-              <a:rPr lang="en-US" sz="1050" dirty="0" smtClean="0"/>
+              <a:rPr lang="en-US" sz="1050" dirty="0"/>
               <a:t>+ </a:t>
             </a:r>
             <a:r>
-              <a:rPr lang="en-US" sz="1050" dirty="0" err="1" smtClean="0"/>
+              <a:rPr lang="en-US" sz="1050" dirty="0" err="1"/>
               <a:t>getPrintableString</a:t>
             </a:r>
             <a:r>
-              <a:rPr lang="en-US" sz="1050" dirty="0" smtClean="0"/>
+              <a:rPr lang="en-US" sz="1050" dirty="0"/>
               <a:t>(): String</a:t>
             </a:r>
             <a:endParaRPr lang="en-SG" sz="1050" dirty="0"/>
@@ -7098,57 +6955,6 @@
       </p:sp>
       <p:sp>
         <p:nvSpPr>
-          <p:cNvPr id="33" name="Rectangle 14"/>
-          <p:cNvSpPr/>
-          <p:nvPr/>
-        </p:nvSpPr>
-        <p:spPr>
-          <a:xfrm>
-            <a:off x="2647520" y="517686"/>
-            <a:ext cx="929296" cy="346760"/>
-          </a:xfrm>
-          <a:prstGeom prst="rect">
-            <a:avLst/>
-          </a:prstGeom>
-          <a:ln w="19050"/>
-          <a:effectLst/>
-        </p:spPr>
-        <p:style>
-          <a:lnRef idx="1">
-            <a:schemeClr val="accent6"/>
-          </a:lnRef>
-          <a:fillRef idx="2">
-            <a:schemeClr val="accent6"/>
-          </a:fillRef>
-          <a:effectRef idx="1">
-            <a:schemeClr val="accent6"/>
-          </a:effectRef>
-          <a:fontRef idx="minor">
-            <a:schemeClr val="dk1"/>
-          </a:fontRef>
-        </p:style>
-        <p:txBody>
-          <a:bodyPr rtlCol="0" anchor="ctr"/>
-          <a:lstStyle/>
-          <a:p>
-            <a:pPr algn="ctr"/>
-            <a:r>
-              <a:rPr lang="en-US" sz="1050" dirty="0" smtClean="0"/>
-              <a:t>Unique</a:t>
-            </a:r>
-            <a:br>
-              <a:rPr lang="en-US" sz="1050" dirty="0" smtClean="0"/>
-            </a:br>
-            <a:r>
-              <a:rPr lang="en-US" sz="1050" dirty="0" err="1" smtClean="0"/>
-              <a:t>TagList</a:t>
-            </a:r>
-            <a:endParaRPr lang="en-SG" sz="1050" dirty="0"/>
-          </a:p>
-        </p:txBody>
-      </p:sp>
-      <p:sp>
-        <p:nvSpPr>
           <p:cNvPr id="34" name="Rectangle 15"/>
           <p:cNvSpPr/>
           <p:nvPr/>
@@ -7184,14 +6990,14 @@
           <a:p>
             <a:pPr algn="ctr"/>
             <a:r>
-              <a:rPr lang="en-US" sz="1050" dirty="0" smtClean="0"/>
+              <a:rPr lang="en-US" sz="1050" dirty="0"/>
               <a:t>Unique</a:t>
             </a:r>
             <a:br>
-              <a:rPr lang="en-US" sz="1050" dirty="0" smtClean="0"/>
+              <a:rPr lang="en-US" sz="1050" dirty="0"/>
             </a:br>
             <a:r>
-              <a:rPr lang="en-US" sz="1050" dirty="0" err="1" smtClean="0"/>
+              <a:rPr lang="en-US" sz="1050" dirty="0" err="1"/>
               <a:t>PersonList</a:t>
             </a:r>
             <a:endParaRPr lang="en-SG" sz="1050" dirty="0"/>
@@ -7235,51 +7041,13 @@
           <a:p>
             <a:pPr algn="ctr"/>
             <a:r>
-              <a:rPr lang="en-US" sz="1050" dirty="0" smtClean="0"/>
+              <a:rPr lang="en-US" sz="1050" dirty="0"/>
               <a:t>Person</a:t>
             </a:r>
             <a:endParaRPr lang="en-SG" sz="1050" dirty="0"/>
           </a:p>
         </p:txBody>
       </p:sp>
-      <p:cxnSp>
-        <p:nvCxnSpPr>
-          <p:cNvPr id="36" name="Elbow Connector 47"/>
-          <p:cNvCxnSpPr>
-            <a:stCxn id="42" idx="3"/>
-            <a:endCxn id="33" idx="1"/>
-          </p:cNvCxnSpPr>
-          <p:nvPr/>
-        </p:nvCxnSpPr>
-        <p:spPr>
-          <a:xfrm flipV="1">
-            <a:off x="2196666" y="691066"/>
-            <a:ext cx="450854" cy="687145"/>
-          </a:xfrm>
-          <a:prstGeom prst="bentConnector3">
-            <a:avLst/>
-          </a:prstGeom>
-          <a:ln w="19050">
-            <a:headEnd type="none" w="med" len="med"/>
-            <a:tailEnd type="arrow" w="med" len="med"/>
-          </a:ln>
-          <a:effectLst/>
-        </p:spPr>
-        <p:style>
-          <a:lnRef idx="1">
-            <a:schemeClr val="accent6"/>
-          </a:lnRef>
-          <a:fillRef idx="2">
-            <a:schemeClr val="accent6"/>
-          </a:fillRef>
-          <a:effectRef idx="1">
-            <a:schemeClr val="accent6"/>
-          </a:effectRef>
-          <a:fontRef idx="minor">
-            <a:schemeClr val="dk1"/>
-          </a:fontRef>
-        </p:style>
-      </p:cxnSp>
       <p:cxnSp>
         <p:nvCxnSpPr>
           <p:cNvPr id="37" name="Elbow Connector 50"/>
@@ -7322,57 +7090,13 @@
       </p:cxnSp>
       <p:sp>
         <p:nvSpPr>
-          <p:cNvPr id="39" name="Rectangle 78"/>
+          <p:cNvPr id="41" name="Flowchart: Decision 99"/>
           <p:cNvSpPr/>
           <p:nvPr/>
         </p:nvSpPr>
         <p:spPr>
           <a:xfrm>
-            <a:off x="4190165" y="517686"/>
-            <a:ext cx="929296" cy="346760"/>
-          </a:xfrm>
-          <a:prstGeom prst="rect">
-            <a:avLst/>
-          </a:prstGeom>
-          <a:ln w="19050"/>
-          <a:effectLst/>
-        </p:spPr>
-        <p:style>
-          <a:lnRef idx="1">
-            <a:schemeClr val="accent6"/>
-          </a:lnRef>
-          <a:fillRef idx="2">
-            <a:schemeClr val="accent6"/>
-          </a:fillRef>
-          <a:effectRef idx="1">
-            <a:schemeClr val="accent6"/>
-          </a:effectRef>
-          <a:fontRef idx="minor">
-            <a:schemeClr val="dk1"/>
-          </a:fontRef>
-        </p:style>
-        <p:txBody>
-          <a:bodyPr rtlCol="0" anchor="ctr"/>
-          <a:lstStyle/>
-          <a:p>
-            <a:pPr algn="ctr"/>
-            <a:r>
-              <a:rPr lang="en-US" sz="1050" dirty="0"/>
-              <a:t>Tag</a:t>
-            </a:r>
-            <a:endParaRPr lang="en-SG" sz="1050" dirty="0"/>
-          </a:p>
-        </p:txBody>
-      </p:sp>
-      <p:sp>
-        <p:nvSpPr>
-          <p:cNvPr id="40" name="Flowchart: Decision 96"/>
-          <p:cNvSpPr/>
-          <p:nvPr/>
-        </p:nvSpPr>
-        <p:spPr>
-          <a:xfrm>
-            <a:off x="3576816" y="617076"/>
+            <a:off x="3540415" y="1924501"/>
             <a:ext cx="236048" cy="173380"/>
           </a:xfrm>
           <a:prstGeom prst="flowChartDecision">
@@ -7407,19 +7131,21 @@
       </p:sp>
       <p:sp>
         <p:nvSpPr>
-          <p:cNvPr id="41" name="Flowchart: Decision 99"/>
+          <p:cNvPr id="42" name="Flowchart: Decision 105"/>
           <p:cNvSpPr/>
           <p:nvPr/>
         </p:nvSpPr>
         <p:spPr>
           <a:xfrm>
-            <a:off x="3540415" y="1924501"/>
+            <a:off x="1960618" y="1291521"/>
             <a:ext cx="236048" cy="173380"/>
           </a:xfrm>
           <a:prstGeom prst="flowChartDecision">
             <a:avLst/>
           </a:prstGeom>
-          <a:noFill/>
+          <a:solidFill>
+            <a:schemeClr val="accent6"/>
+          </a:solidFill>
           <a:ln w="19050"/>
           <a:effectLst/>
         </p:spPr>
@@ -7446,87 +7172,6 @@
           </a:p>
         </p:txBody>
       </p:sp>
-      <p:sp>
-        <p:nvSpPr>
-          <p:cNvPr id="42" name="Flowchart: Decision 105"/>
-          <p:cNvSpPr/>
-          <p:nvPr/>
-        </p:nvSpPr>
-        <p:spPr>
-          <a:xfrm>
-            <a:off x="1960618" y="1291521"/>
-            <a:ext cx="236048" cy="173380"/>
-          </a:xfrm>
-          <a:prstGeom prst="flowChartDecision">
-            <a:avLst/>
-          </a:prstGeom>
-          <a:solidFill>
-            <a:schemeClr val="accent6"/>
-          </a:solidFill>
-          <a:ln w="19050"/>
-          <a:effectLst/>
-        </p:spPr>
-        <p:style>
-          <a:lnRef idx="1">
-            <a:schemeClr val="accent6"/>
-          </a:lnRef>
-          <a:fillRef idx="2">
-            <a:schemeClr val="accent6"/>
-          </a:fillRef>
-          <a:effectRef idx="1">
-            <a:schemeClr val="accent6"/>
-          </a:effectRef>
-          <a:fontRef idx="minor">
-            <a:schemeClr val="dk1"/>
-          </a:fontRef>
-        </p:style>
-        <p:txBody>
-          <a:bodyPr rtlCol="0" anchor="ctr"/>
-          <a:lstStyle/>
-          <a:p>
-            <a:pPr algn="ctr"/>
-            <a:endParaRPr lang="en-US" sz="1050"/>
-          </a:p>
-        </p:txBody>
-      </p:sp>
-      <p:cxnSp>
-        <p:nvCxnSpPr>
-          <p:cNvPr id="43" name="Straight Arrow Connector 113"/>
-          <p:cNvCxnSpPr>
-            <a:stCxn id="40" idx="3"/>
-            <a:endCxn id="39" idx="1"/>
-          </p:cNvCxnSpPr>
-          <p:nvPr/>
-        </p:nvCxnSpPr>
-        <p:spPr>
-          <a:xfrm flipV="1">
-            <a:off x="3812864" y="691066"/>
-            <a:ext cx="377301" cy="12700"/>
-          </a:xfrm>
-          <a:prstGeom prst="straightConnector1">
-            <a:avLst/>
-          </a:prstGeom>
-          <a:ln w="19050">
-            <a:headEnd type="none" w="med" len="med"/>
-            <a:tailEnd type="arrow" w="med" len="med"/>
-          </a:ln>
-          <a:effectLst/>
-        </p:spPr>
-        <p:style>
-          <a:lnRef idx="1">
-            <a:schemeClr val="accent6"/>
-          </a:lnRef>
-          <a:fillRef idx="2">
-            <a:schemeClr val="accent6"/>
-          </a:fillRef>
-          <a:effectRef idx="1">
-            <a:schemeClr val="accent6"/>
-          </a:effectRef>
-          <a:fontRef idx="minor">
-            <a:schemeClr val="dk1"/>
-          </a:fontRef>
-        </p:style>
-      </p:cxnSp>
       <p:cxnSp>
         <p:nvCxnSpPr>
           <p:cNvPr id="44" name="Straight Arrow Connector 114"/>
@@ -7602,7 +7247,7 @@
           <a:p>
             <a:pPr algn="ctr"/>
             <a:r>
-              <a:rPr lang="en-US" sz="1050" dirty="0" smtClean="0"/>
+              <a:rPr lang="en-US" sz="1050" dirty="0"/>
               <a:t>Tagging</a:t>
             </a:r>
             <a:endParaRPr lang="en-SG" sz="1050" dirty="0"/>
@@ -7613,8 +7258,8 @@
         <p:nvCxnSpPr>
           <p:cNvPr id="49" name="Straight Arrow Connector 48"/>
           <p:cNvCxnSpPr>
+            <a:cxnSpLocks/>
             <a:stCxn id="35" idx="0"/>
-            <a:endCxn id="39" idx="2"/>
           </p:cNvCxnSpPr>
           <p:nvPr/>
         </p:nvCxnSpPr>
@@ -7746,7 +7391,7 @@
           <a:lstStyle/>
           <a:p>
             <a:r>
-              <a:rPr lang="en-US" dirty="0" smtClean="0">
+              <a:rPr lang="en-US" dirty="0">
                 <a:solidFill>
                   <a:schemeClr val="accent6">
                     <a:lumMod val="75000"/>
@@ -7755,13 +7400,6 @@
               </a:rPr>
               <a:t>*</a:t>
             </a:r>
-            <a:endParaRPr lang="en-US" dirty="0">
-              <a:solidFill>
-                <a:schemeClr val="accent6">
-                  <a:lumMod val="75000"/>
-                </a:schemeClr>
-              </a:solidFill>
-            </a:endParaRPr>
           </a:p>
         </p:txBody>
       </p:sp>
@@ -7788,7 +7426,7 @@
           <a:lstStyle/>
           <a:p>
             <a:r>
-              <a:rPr lang="en-US" sz="1100" dirty="0" err="1" smtClean="0">
+              <a:rPr lang="en-US" sz="1100" dirty="0" err="1">
                 <a:solidFill>
                   <a:schemeClr val="accent6">
                     <a:lumMod val="75000"/>
@@ -7802,6 +7440,149 @@
                 <a:schemeClr val="accent6">
                   <a:lumMod val="75000"/>
                 </a:schemeClr>
+              </a:solidFill>
+            </a:endParaRPr>
+          </a:p>
+        </p:txBody>
+      </p:sp>
+      <p:sp>
+        <p:nvSpPr>
+          <p:cNvPr id="50" name="TextBox 49">
+            <a:extLst>
+              <a:ext uri="{FF2B5EF4-FFF2-40B4-BE49-F238E27FC236}">
+                <a16:creationId xmlns:a16="http://schemas.microsoft.com/office/drawing/2014/main" id="{547FC8F4-44FA-4B7F-B527-59FA7E33746A}"/>
+              </a:ext>
+            </a:extLst>
+          </p:cNvPr>
+          <p:cNvSpPr txBox="1"/>
+          <p:nvPr/>
+        </p:nvSpPr>
+        <p:spPr>
+          <a:xfrm>
+            <a:off x="4732135" y="855333"/>
+            <a:ext cx="88232" cy="369332"/>
+          </a:xfrm>
+          <a:prstGeom prst="rect">
+            <a:avLst/>
+          </a:prstGeom>
+          <a:noFill/>
+        </p:spPr>
+        <p:txBody>
+          <a:bodyPr wrap="square" rtlCol="0">
+            <a:spAutoFit/>
+          </a:bodyPr>
+          <a:lstStyle/>
+          <a:p>
+            <a:r>
+              <a:rPr lang="en-US" dirty="0">
+                <a:solidFill>
+                  <a:schemeClr val="accent6">
+                    <a:lumMod val="75000"/>
+                  </a:schemeClr>
+                </a:solidFill>
+              </a:rPr>
+              <a:t>*</a:t>
+            </a:r>
+          </a:p>
+        </p:txBody>
+      </p:sp>
+      <p:sp>
+        <p:nvSpPr>
+          <p:cNvPr id="47" name="Rectangle 6">
+            <a:extLst>
+              <a:ext uri="{FF2B5EF4-FFF2-40B4-BE49-F238E27FC236}">
+                <a16:creationId xmlns:a16="http://schemas.microsoft.com/office/drawing/2014/main" id="{2BCA4B2E-33C0-499B-8F0A-E39754DA533E}"/>
+              </a:ext>
+            </a:extLst>
+          </p:cNvPr>
+          <p:cNvSpPr/>
+          <p:nvPr/>
+        </p:nvSpPr>
+        <p:spPr>
+          <a:xfrm>
+            <a:off x="4190165" y="508573"/>
+            <a:ext cx="929296" cy="342611"/>
+          </a:xfrm>
+          <a:prstGeom prst="rect">
+            <a:avLst/>
+          </a:prstGeom>
+          <a:ln w="19050"/>
+          <a:effectLst/>
+        </p:spPr>
+        <p:style>
+          <a:lnRef idx="1">
+            <a:schemeClr val="accent4"/>
+          </a:lnRef>
+          <a:fillRef idx="2">
+            <a:schemeClr val="accent4"/>
+          </a:fillRef>
+          <a:effectRef idx="1">
+            <a:schemeClr val="accent4"/>
+          </a:effectRef>
+          <a:fontRef idx="minor">
+            <a:schemeClr val="dk1"/>
+          </a:fontRef>
+        </p:style>
+        <p:txBody>
+          <a:bodyPr rtlCol="0" anchor="ctr"/>
+          <a:lstStyle/>
+          <a:p>
+            <a:pPr algn="ctr"/>
+            <a:r>
+              <a:rPr lang="en-SG" sz="1050" dirty="0"/>
+              <a:t>Tag</a:t>
+            </a:r>
+          </a:p>
+        </p:txBody>
+      </p:sp>
+      <p:sp>
+        <p:nvSpPr>
+          <p:cNvPr id="48" name="Flowchart: Decision 47">
+            <a:extLst>
+              <a:ext uri="{FF2B5EF4-FFF2-40B4-BE49-F238E27FC236}">
+                <a16:creationId xmlns:a16="http://schemas.microsoft.com/office/drawing/2014/main" id="{C80A0EAB-3C63-4587-9324-06EA9E915443}"/>
+              </a:ext>
+            </a:extLst>
+          </p:cNvPr>
+          <p:cNvSpPr/>
+          <p:nvPr/>
+        </p:nvSpPr>
+        <p:spPr>
+          <a:xfrm>
+            <a:off x="4533108" y="1600200"/>
+            <a:ext cx="236048" cy="214819"/>
+          </a:xfrm>
+          <a:prstGeom prst="flowChartDecision">
+            <a:avLst/>
+          </a:prstGeom>
+          <a:solidFill>
+            <a:schemeClr val="accent6"/>
+          </a:solidFill>
+          <a:ln w="19050"/>
+          <a:effectLst/>
+        </p:spPr>
+        <p:style>
+          <a:lnRef idx="1">
+            <a:schemeClr val="accent6"/>
+          </a:lnRef>
+          <a:fillRef idx="2">
+            <a:schemeClr val="accent6"/>
+          </a:fillRef>
+          <a:effectRef idx="1">
+            <a:schemeClr val="accent6"/>
+          </a:effectRef>
+          <a:fontRef idx="minor">
+            <a:schemeClr val="dk1"/>
+          </a:fontRef>
+        </p:style>
+        <p:txBody>
+          <a:bodyPr rtlCol="0" anchor="ctr"/>
+          <a:lstStyle/>
+          <a:p>
+            <a:pPr algn="ctr"/>
+            <a:endParaRPr lang="en-US" sz="1050">
+              <a:solidFill>
+                <a:schemeClr val="dk1"/>
               </a:solidFill>
             </a:endParaRPr>
           </a:p>
@@ -7883,57 +7664,6 @@
       </p:sp>
       <p:sp>
         <p:nvSpPr>
-          <p:cNvPr id="3" name="Rectangle 14"/>
-          <p:cNvSpPr/>
-          <p:nvPr/>
-        </p:nvSpPr>
-        <p:spPr>
-          <a:xfrm>
-            <a:off x="2647520" y="517686"/>
-            <a:ext cx="929296" cy="346760"/>
-          </a:xfrm>
-          <a:prstGeom prst="rect">
-            <a:avLst/>
-          </a:prstGeom>
-          <a:ln w="19050"/>
-          <a:effectLst/>
-        </p:spPr>
-        <p:style>
-          <a:lnRef idx="1">
-            <a:schemeClr val="accent6"/>
-          </a:lnRef>
-          <a:fillRef idx="2">
-            <a:schemeClr val="accent6"/>
-          </a:fillRef>
-          <a:effectRef idx="1">
-            <a:schemeClr val="accent6"/>
-          </a:effectRef>
-          <a:fontRef idx="minor">
-            <a:schemeClr val="dk1"/>
-          </a:fontRef>
-        </p:style>
-        <p:txBody>
-          <a:bodyPr rtlCol="0" anchor="ctr"/>
-          <a:lstStyle/>
-          <a:p>
-            <a:pPr algn="ctr"/>
-            <a:r>
-              <a:rPr lang="en-US" sz="1050" dirty="0" smtClean="0"/>
-              <a:t>Unique</a:t>
-            </a:r>
-            <a:br>
-              <a:rPr lang="en-US" sz="1050" dirty="0" smtClean="0"/>
-            </a:br>
-            <a:r>
-              <a:rPr lang="en-US" sz="1050" dirty="0" err="1" smtClean="0"/>
-              <a:t>TagList</a:t>
-            </a:r>
-            <a:endParaRPr lang="en-SG" sz="1050" dirty="0"/>
-          </a:p>
-        </p:txBody>
-      </p:sp>
-      <p:sp>
-        <p:nvSpPr>
           <p:cNvPr id="4" name="Rectangle 15"/>
           <p:cNvSpPr/>
           <p:nvPr/>
@@ -7969,14 +7699,14 @@
           <a:p>
             <a:pPr algn="ctr"/>
             <a:r>
-              <a:rPr lang="en-US" sz="1050" dirty="0" smtClean="0"/>
+              <a:rPr lang="en-US" sz="1050" dirty="0"/>
               <a:t>Unique</a:t>
             </a:r>
             <a:br>
-              <a:rPr lang="en-US" sz="1050" dirty="0" smtClean="0"/>
+              <a:rPr lang="en-US" sz="1050" dirty="0"/>
             </a:br>
             <a:r>
-              <a:rPr lang="en-US" sz="1050" dirty="0" err="1" smtClean="0"/>
+              <a:rPr lang="en-US" sz="1050" dirty="0" err="1"/>
               <a:t>PersonList</a:t>
             </a:r>
             <a:endParaRPr lang="en-SG" sz="1050" dirty="0"/>
@@ -8020,51 +7750,13 @@
           <a:p>
             <a:pPr algn="ctr"/>
             <a:r>
-              <a:rPr lang="en-US" sz="1050" dirty="0" smtClean="0"/>
+              <a:rPr lang="en-US" sz="1050" dirty="0"/>
               <a:t>Person</a:t>
             </a:r>
             <a:endParaRPr lang="en-SG" sz="1050" dirty="0"/>
           </a:p>
         </p:txBody>
       </p:sp>
-      <p:cxnSp>
-        <p:nvCxnSpPr>
-          <p:cNvPr id="6" name="Elbow Connector 47"/>
-          <p:cNvCxnSpPr>
-            <a:stCxn id="11" idx="3"/>
-            <a:endCxn id="3" idx="1"/>
-          </p:cNvCxnSpPr>
-          <p:nvPr/>
-        </p:nvCxnSpPr>
-        <p:spPr>
-          <a:xfrm flipV="1">
-            <a:off x="2196666" y="691066"/>
-            <a:ext cx="450854" cy="687145"/>
-          </a:xfrm>
-          <a:prstGeom prst="bentConnector3">
-            <a:avLst/>
-          </a:prstGeom>
-          <a:ln w="19050">
-            <a:headEnd type="none" w="med" len="med"/>
-            <a:tailEnd type="arrow" w="med" len="med"/>
-          </a:ln>
-          <a:effectLst/>
-        </p:spPr>
-        <p:style>
-          <a:lnRef idx="1">
-            <a:schemeClr val="accent6"/>
-          </a:lnRef>
-          <a:fillRef idx="2">
-            <a:schemeClr val="accent6"/>
-          </a:fillRef>
-          <a:effectRef idx="1">
-            <a:schemeClr val="accent6"/>
-          </a:effectRef>
-          <a:fontRef idx="minor">
-            <a:schemeClr val="dk1"/>
-          </a:fontRef>
-        </p:style>
-      </p:cxnSp>
       <p:cxnSp>
         <p:nvCxnSpPr>
           <p:cNvPr id="7" name="Elbow Connector 50"/>
@@ -8107,57 +7799,13 @@
       </p:cxnSp>
       <p:sp>
         <p:nvSpPr>
-          <p:cNvPr id="8" name="Rectangle 78"/>
+          <p:cNvPr id="10" name="Flowchart: Decision 99"/>
           <p:cNvSpPr/>
           <p:nvPr/>
         </p:nvSpPr>
         <p:spPr>
           <a:xfrm>
-            <a:off x="4190165" y="517686"/>
-            <a:ext cx="929296" cy="346760"/>
-          </a:xfrm>
-          <a:prstGeom prst="rect">
-            <a:avLst/>
-          </a:prstGeom>
-          <a:ln w="19050"/>
-          <a:effectLst/>
-        </p:spPr>
-        <p:style>
-          <a:lnRef idx="1">
-            <a:schemeClr val="accent6"/>
-          </a:lnRef>
-          <a:fillRef idx="2">
-            <a:schemeClr val="accent6"/>
-          </a:fillRef>
-          <a:effectRef idx="1">
-            <a:schemeClr val="accent6"/>
-          </a:effectRef>
-          <a:fontRef idx="minor">
-            <a:schemeClr val="dk1"/>
-          </a:fontRef>
-        </p:style>
-        <p:txBody>
-          <a:bodyPr rtlCol="0" anchor="ctr"/>
-          <a:lstStyle/>
-          <a:p>
-            <a:pPr algn="ctr"/>
-            <a:r>
-              <a:rPr lang="en-US" sz="1050" dirty="0"/>
-              <a:t>Tag</a:t>
-            </a:r>
-            <a:endParaRPr lang="en-SG" sz="1050" dirty="0"/>
-          </a:p>
-        </p:txBody>
-      </p:sp>
-      <p:sp>
-        <p:nvSpPr>
-          <p:cNvPr id="9" name="Flowchart: Decision 96"/>
-          <p:cNvSpPr/>
-          <p:nvPr/>
-        </p:nvSpPr>
-        <p:spPr>
-          <a:xfrm>
-            <a:off x="3576816" y="617076"/>
+            <a:off x="3540415" y="1924501"/>
             <a:ext cx="236048" cy="173380"/>
           </a:xfrm>
           <a:prstGeom prst="flowChartDecision">
@@ -8192,19 +7840,21 @@
       </p:sp>
       <p:sp>
         <p:nvSpPr>
-          <p:cNvPr id="10" name="Flowchart: Decision 99"/>
+          <p:cNvPr id="11" name="Flowchart: Decision 105"/>
           <p:cNvSpPr/>
           <p:nvPr/>
         </p:nvSpPr>
         <p:spPr>
           <a:xfrm>
-            <a:off x="3540415" y="1924501"/>
+            <a:off x="1960618" y="1291521"/>
             <a:ext cx="236048" cy="173380"/>
           </a:xfrm>
           <a:prstGeom prst="flowChartDecision">
             <a:avLst/>
           </a:prstGeom>
-          <a:noFill/>
+          <a:solidFill>
+            <a:schemeClr val="accent6"/>
+          </a:solidFill>
           <a:ln w="19050"/>
           <a:effectLst/>
         </p:spPr>
@@ -8231,87 +7881,6 @@
           </a:p>
         </p:txBody>
       </p:sp>
-      <p:sp>
-        <p:nvSpPr>
-          <p:cNvPr id="11" name="Flowchart: Decision 105"/>
-          <p:cNvSpPr/>
-          <p:nvPr/>
-        </p:nvSpPr>
-        <p:spPr>
-          <a:xfrm>
-            <a:off x="1960618" y="1291521"/>
-            <a:ext cx="236048" cy="173380"/>
-          </a:xfrm>
-          <a:prstGeom prst="flowChartDecision">
-            <a:avLst/>
-          </a:prstGeom>
-          <a:solidFill>
-            <a:schemeClr val="accent6"/>
-          </a:solidFill>
-          <a:ln w="19050"/>
-          <a:effectLst/>
-        </p:spPr>
-        <p:style>
-          <a:lnRef idx="1">
-            <a:schemeClr val="accent6"/>
-          </a:lnRef>
-          <a:fillRef idx="2">
-            <a:schemeClr val="accent6"/>
-          </a:fillRef>
-          <a:effectRef idx="1">
-            <a:schemeClr val="accent6"/>
-          </a:effectRef>
-          <a:fontRef idx="minor">
-            <a:schemeClr val="dk1"/>
-          </a:fontRef>
-        </p:style>
-        <p:txBody>
-          <a:bodyPr rtlCol="0" anchor="ctr"/>
-          <a:lstStyle/>
-          <a:p>
-            <a:pPr algn="ctr"/>
-            <a:endParaRPr lang="en-US" sz="1050"/>
-          </a:p>
-        </p:txBody>
-      </p:sp>
-      <p:cxnSp>
-        <p:nvCxnSpPr>
-          <p:cNvPr id="12" name="Straight Arrow Connector 113"/>
-          <p:cNvCxnSpPr>
-            <a:stCxn id="9" idx="3"/>
-            <a:endCxn id="8" idx="1"/>
-          </p:cNvCxnSpPr>
-          <p:nvPr/>
-        </p:nvCxnSpPr>
-        <p:spPr>
-          <a:xfrm flipV="1">
-            <a:off x="3812864" y="691066"/>
-            <a:ext cx="377301" cy="12700"/>
-          </a:xfrm>
-          <a:prstGeom prst="straightConnector1">
-            <a:avLst/>
-          </a:prstGeom>
-          <a:ln w="19050">
-            <a:headEnd type="none" w="med" len="med"/>
-            <a:tailEnd type="arrow" w="med" len="med"/>
-          </a:ln>
-          <a:effectLst/>
-        </p:spPr>
-        <p:style>
-          <a:lnRef idx="1">
-            <a:schemeClr val="accent6"/>
-          </a:lnRef>
-          <a:fillRef idx="2">
-            <a:schemeClr val="accent6"/>
-          </a:fillRef>
-          <a:effectRef idx="1">
-            <a:schemeClr val="accent6"/>
-          </a:effectRef>
-          <a:fontRef idx="minor">
-            <a:schemeClr val="dk1"/>
-          </a:fontRef>
-        </p:style>
-      </p:cxnSp>
       <p:cxnSp>
         <p:nvCxnSpPr>
           <p:cNvPr id="13" name="Straight Arrow Connector 114"/>
@@ -8387,7 +7956,7 @@
           <a:p>
             <a:pPr algn="ctr"/>
             <a:r>
-              <a:rPr lang="en-US" sz="1050" dirty="0" smtClean="0"/>
+              <a:rPr lang="en-US" sz="1050" dirty="0"/>
               <a:t>Tagging</a:t>
             </a:r>
             <a:endParaRPr lang="en-SG" sz="1050" dirty="0"/>
@@ -8398,8 +7967,8 @@
         <p:nvCxnSpPr>
           <p:cNvPr id="15" name="Straight Arrow Connector 48"/>
           <p:cNvCxnSpPr>
+            <a:cxnSpLocks/>
             <a:stCxn id="5" idx="0"/>
-            <a:endCxn id="8" idx="2"/>
           </p:cNvCxnSpPr>
           <p:nvPr/>
         </p:nvCxnSpPr>
@@ -8493,7 +8062,7 @@
           <a:lstStyle/>
           <a:p>
             <a:r>
-              <a:rPr lang="en-US" dirty="0" smtClean="0">
+              <a:rPr lang="en-US" dirty="0">
                 <a:solidFill>
                   <a:schemeClr val="accent6">
                     <a:lumMod val="75000"/>
@@ -8502,13 +8071,6 @@
               </a:rPr>
               <a:t>*</a:t>
             </a:r>
-            <a:endParaRPr lang="en-US" dirty="0">
-              <a:solidFill>
-                <a:schemeClr val="accent6">
-                  <a:lumMod val="75000"/>
-                </a:schemeClr>
-              </a:solidFill>
-            </a:endParaRPr>
           </a:p>
         </p:txBody>
       </p:sp>
@@ -8617,7 +8179,7 @@
           <a:lstStyle/>
           <a:p>
             <a:r>
-              <a:rPr lang="en-US" sz="1100" dirty="0" err="1" smtClean="0">
+              <a:rPr lang="en-US" sz="1100" dirty="0" err="1">
                 <a:solidFill>
                   <a:schemeClr val="accent6">
                     <a:lumMod val="75000"/>
@@ -8633,6 +8195,149 @@
                 </a:schemeClr>
               </a:solidFill>
             </a:endParaRPr>
+          </a:p>
+        </p:txBody>
+      </p:sp>
+      <p:sp>
+        <p:nvSpPr>
+          <p:cNvPr id="21" name="TextBox 20">
+            <a:extLst>
+              <a:ext uri="{FF2B5EF4-FFF2-40B4-BE49-F238E27FC236}">
+                <a16:creationId xmlns:a16="http://schemas.microsoft.com/office/drawing/2014/main" id="{020E80CC-8B15-45D9-8AD0-98AE2C92B793}"/>
+              </a:ext>
+            </a:extLst>
+          </p:cNvPr>
+          <p:cNvSpPr txBox="1"/>
+          <p:nvPr/>
+        </p:nvSpPr>
+        <p:spPr>
+          <a:xfrm>
+            <a:off x="4697387" y="843765"/>
+            <a:ext cx="88232" cy="369332"/>
+          </a:xfrm>
+          <a:prstGeom prst="rect">
+            <a:avLst/>
+          </a:prstGeom>
+          <a:noFill/>
+        </p:spPr>
+        <p:txBody>
+          <a:bodyPr wrap="square" rtlCol="0">
+            <a:spAutoFit/>
+          </a:bodyPr>
+          <a:lstStyle/>
+          <a:p>
+            <a:r>
+              <a:rPr lang="en-US" dirty="0">
+                <a:solidFill>
+                  <a:schemeClr val="accent6">
+                    <a:lumMod val="75000"/>
+                  </a:schemeClr>
+                </a:solidFill>
+              </a:rPr>
+              <a:t>*</a:t>
+            </a:r>
+          </a:p>
+        </p:txBody>
+      </p:sp>
+      <p:sp>
+        <p:nvSpPr>
+          <p:cNvPr id="19" name="Flowchart: Decision 18">
+            <a:extLst>
+              <a:ext uri="{FF2B5EF4-FFF2-40B4-BE49-F238E27FC236}">
+                <a16:creationId xmlns:a16="http://schemas.microsoft.com/office/drawing/2014/main" id="{DCD92E83-9683-4CE1-AE57-B3BE1E853163}"/>
+              </a:ext>
+            </a:extLst>
+          </p:cNvPr>
+          <p:cNvSpPr/>
+          <p:nvPr/>
+        </p:nvSpPr>
+        <p:spPr>
+          <a:xfrm>
+            <a:off x="4536789" y="1647438"/>
+            <a:ext cx="236048" cy="173380"/>
+          </a:xfrm>
+          <a:prstGeom prst="flowChartDecision">
+            <a:avLst/>
+          </a:prstGeom>
+          <a:solidFill>
+            <a:schemeClr val="accent6"/>
+          </a:solidFill>
+          <a:ln w="19050"/>
+          <a:effectLst/>
+        </p:spPr>
+        <p:style>
+          <a:lnRef idx="1">
+            <a:schemeClr val="accent6"/>
+          </a:lnRef>
+          <a:fillRef idx="2">
+            <a:schemeClr val="accent6"/>
+          </a:fillRef>
+          <a:effectRef idx="1">
+            <a:schemeClr val="accent6"/>
+          </a:effectRef>
+          <a:fontRef idx="minor">
+            <a:schemeClr val="dk1"/>
+          </a:fontRef>
+        </p:style>
+        <p:txBody>
+          <a:bodyPr rtlCol="0" anchor="ctr"/>
+          <a:lstStyle/>
+          <a:p>
+            <a:pPr algn="ctr"/>
+            <a:endParaRPr lang="en-US" sz="1050">
+              <a:solidFill>
+                <a:schemeClr val="dk1"/>
+              </a:solidFill>
+            </a:endParaRPr>
+          </a:p>
+        </p:txBody>
+      </p:sp>
+      <p:sp>
+        <p:nvSpPr>
+          <p:cNvPr id="23" name="Rectangle 6">
+            <a:extLst>
+              <a:ext uri="{FF2B5EF4-FFF2-40B4-BE49-F238E27FC236}">
+                <a16:creationId xmlns:a16="http://schemas.microsoft.com/office/drawing/2014/main" id="{2A3380B6-3211-46D7-B1E4-229305E41FB3}"/>
+              </a:ext>
+            </a:extLst>
+          </p:cNvPr>
+          <p:cNvSpPr/>
+          <p:nvPr/>
+        </p:nvSpPr>
+        <p:spPr>
+          <a:xfrm>
+            <a:off x="4190165" y="509814"/>
+            <a:ext cx="929296" cy="342611"/>
+          </a:xfrm>
+          <a:prstGeom prst="rect">
+            <a:avLst/>
+          </a:prstGeom>
+          <a:ln w="19050"/>
+          <a:effectLst/>
+        </p:spPr>
+        <p:style>
+          <a:lnRef idx="1">
+            <a:schemeClr val="accent4"/>
+          </a:lnRef>
+          <a:fillRef idx="2">
+            <a:schemeClr val="accent4"/>
+          </a:fillRef>
+          <a:effectRef idx="1">
+            <a:schemeClr val="accent4"/>
+          </a:effectRef>
+          <a:fontRef idx="minor">
+            <a:schemeClr val="dk1"/>
+          </a:fontRef>
+        </p:style>
+        <p:txBody>
+          <a:bodyPr rtlCol="0" anchor="ctr"/>
+          <a:lstStyle/>
+          <a:p>
+            <a:pPr algn="ctr"/>
+            <a:r>
+              <a:rPr lang="en-SG" sz="1050" dirty="0"/>
+              <a:t>Tag</a:t>
+            </a:r>
           </a:p>
         </p:txBody>
       </p:sp>

</xml_diff>

<commit_message>
Developer Guide: Fix spelling error ``` Spelling of ClearCommand was incorrect in Design.
Let's correct the spelling.
```
</commit_message>
<xml_diff>
--- a/docs/Diagrams.pptx
+++ b/docs/Diagrams.pptx
@@ -305,7 +305,7 @@
           <a:p>
             <a:fld id="{78C97017-6FC3-485B-9764-EAC9E56C1D49}" type="datetimeFigureOut">
               <a:rPr lang="en-US" smtClean="0"/>
-              <a:t>8/7/2018</a:t>
+              <a:t>9/21/18</a:t>
             </a:fld>
             <a:endParaRPr lang="en-US"/>
           </a:p>
@@ -473,7 +473,7 @@
           <a:p>
             <a:fld id="{78C97017-6FC3-485B-9764-EAC9E56C1D49}" type="datetimeFigureOut">
               <a:rPr lang="en-US" smtClean="0"/>
-              <a:t>8/7/2018</a:t>
+              <a:t>9/21/18</a:t>
             </a:fld>
             <a:endParaRPr lang="en-US"/>
           </a:p>
@@ -651,7 +651,7 @@
           <a:p>
             <a:fld id="{78C97017-6FC3-485B-9764-EAC9E56C1D49}" type="datetimeFigureOut">
               <a:rPr lang="en-US" smtClean="0"/>
-              <a:t>8/7/2018</a:t>
+              <a:t>9/21/18</a:t>
             </a:fld>
             <a:endParaRPr lang="en-US"/>
           </a:p>
@@ -819,7 +819,7 @@
           <a:p>
             <a:fld id="{78C97017-6FC3-485B-9764-EAC9E56C1D49}" type="datetimeFigureOut">
               <a:rPr lang="en-US" smtClean="0"/>
-              <a:t>8/7/2018</a:t>
+              <a:t>9/21/18</a:t>
             </a:fld>
             <a:endParaRPr lang="en-US"/>
           </a:p>
@@ -1064,7 +1064,7 @@
           <a:p>
             <a:fld id="{78C97017-6FC3-485B-9764-EAC9E56C1D49}" type="datetimeFigureOut">
               <a:rPr lang="en-US" smtClean="0"/>
-              <a:t>8/7/2018</a:t>
+              <a:t>9/21/18</a:t>
             </a:fld>
             <a:endParaRPr lang="en-US"/>
           </a:p>
@@ -1349,7 +1349,7 @@
           <a:p>
             <a:fld id="{78C97017-6FC3-485B-9764-EAC9E56C1D49}" type="datetimeFigureOut">
               <a:rPr lang="en-US" smtClean="0"/>
-              <a:t>8/7/2018</a:t>
+              <a:t>9/21/18</a:t>
             </a:fld>
             <a:endParaRPr lang="en-US"/>
           </a:p>
@@ -1768,7 +1768,7 @@
           <a:p>
             <a:fld id="{78C97017-6FC3-485B-9764-EAC9E56C1D49}" type="datetimeFigureOut">
               <a:rPr lang="en-US" smtClean="0"/>
-              <a:t>8/7/2018</a:t>
+              <a:t>9/21/18</a:t>
             </a:fld>
             <a:endParaRPr lang="en-US"/>
           </a:p>
@@ -1885,7 +1885,7 @@
           <a:p>
             <a:fld id="{78C97017-6FC3-485B-9764-EAC9E56C1D49}" type="datetimeFigureOut">
               <a:rPr lang="en-US" smtClean="0"/>
-              <a:t>8/7/2018</a:t>
+              <a:t>9/21/18</a:t>
             </a:fld>
             <a:endParaRPr lang="en-US"/>
           </a:p>
@@ -1980,7 +1980,7 @@
           <a:p>
             <a:fld id="{78C97017-6FC3-485B-9764-EAC9E56C1D49}" type="datetimeFigureOut">
               <a:rPr lang="en-US" smtClean="0"/>
-              <a:t>8/7/2018</a:t>
+              <a:t>9/21/18</a:t>
             </a:fld>
             <a:endParaRPr lang="en-US"/>
           </a:p>
@@ -2255,7 +2255,7 @@
           <a:p>
             <a:fld id="{78C97017-6FC3-485B-9764-EAC9E56C1D49}" type="datetimeFigureOut">
               <a:rPr lang="en-US" smtClean="0"/>
-              <a:t>8/7/2018</a:t>
+              <a:t>9/21/18</a:t>
             </a:fld>
             <a:endParaRPr lang="en-US"/>
           </a:p>
@@ -2507,7 +2507,7 @@
           <a:p>
             <a:fld id="{78C97017-6FC3-485B-9764-EAC9E56C1D49}" type="datetimeFigureOut">
               <a:rPr lang="en-US" smtClean="0"/>
-              <a:t>8/7/2018</a:t>
+              <a:t>9/21/18</a:t>
             </a:fld>
             <a:endParaRPr lang="en-US"/>
           </a:p>
@@ -2718,7 +2718,7 @@
           <a:p>
             <a:fld id="{78C97017-6FC3-485B-9764-EAC9E56C1D49}" type="datetimeFigureOut">
               <a:rPr lang="en-US" smtClean="0"/>
-              <a:t>8/7/2018</a:t>
+              <a:t>9/21/18</a:t>
             </a:fld>
             <a:endParaRPr lang="en-US"/>
           </a:p>
@@ -4422,7 +4422,7 @@
             <a:pPr algn="ctr"/>
             <a:r>
               <a:rPr lang="en-US" sz="1050" dirty="0" err="1"/>
-              <a:t>CrearCommand</a:t>
+              <a:t>ClearCommand</a:t>
             </a:r>
             <a:endParaRPr lang="en-SG" sz="1050" dirty="0"/>
           </a:p>

</xml_diff>

<commit_message>
Developer Guide: Fix spelling error
Spelling of ClearCommand was incorrect in Design.

Let's correct the spelling.
</commit_message>
<xml_diff>
--- a/docs/Diagrams.pptx
+++ b/docs/Diagrams.pptx
@@ -305,7 +305,7 @@
           <a:p>
             <a:fld id="{78C97017-6FC3-485B-9764-EAC9E56C1D49}" type="datetimeFigureOut">
               <a:rPr lang="en-US" smtClean="0"/>
-              <a:t>8/7/2018</a:t>
+              <a:t>9/21/18</a:t>
             </a:fld>
             <a:endParaRPr lang="en-US"/>
           </a:p>
@@ -473,7 +473,7 @@
           <a:p>
             <a:fld id="{78C97017-6FC3-485B-9764-EAC9E56C1D49}" type="datetimeFigureOut">
               <a:rPr lang="en-US" smtClean="0"/>
-              <a:t>8/7/2018</a:t>
+              <a:t>9/21/18</a:t>
             </a:fld>
             <a:endParaRPr lang="en-US"/>
           </a:p>
@@ -651,7 +651,7 @@
           <a:p>
             <a:fld id="{78C97017-6FC3-485B-9764-EAC9E56C1D49}" type="datetimeFigureOut">
               <a:rPr lang="en-US" smtClean="0"/>
-              <a:t>8/7/2018</a:t>
+              <a:t>9/21/18</a:t>
             </a:fld>
             <a:endParaRPr lang="en-US"/>
           </a:p>
@@ -819,7 +819,7 @@
           <a:p>
             <a:fld id="{78C97017-6FC3-485B-9764-EAC9E56C1D49}" type="datetimeFigureOut">
               <a:rPr lang="en-US" smtClean="0"/>
-              <a:t>8/7/2018</a:t>
+              <a:t>9/21/18</a:t>
             </a:fld>
             <a:endParaRPr lang="en-US"/>
           </a:p>
@@ -1064,7 +1064,7 @@
           <a:p>
             <a:fld id="{78C97017-6FC3-485B-9764-EAC9E56C1D49}" type="datetimeFigureOut">
               <a:rPr lang="en-US" smtClean="0"/>
-              <a:t>8/7/2018</a:t>
+              <a:t>9/21/18</a:t>
             </a:fld>
             <a:endParaRPr lang="en-US"/>
           </a:p>
@@ -1349,7 +1349,7 @@
           <a:p>
             <a:fld id="{78C97017-6FC3-485B-9764-EAC9E56C1D49}" type="datetimeFigureOut">
               <a:rPr lang="en-US" smtClean="0"/>
-              <a:t>8/7/2018</a:t>
+              <a:t>9/21/18</a:t>
             </a:fld>
             <a:endParaRPr lang="en-US"/>
           </a:p>
@@ -1768,7 +1768,7 @@
           <a:p>
             <a:fld id="{78C97017-6FC3-485B-9764-EAC9E56C1D49}" type="datetimeFigureOut">
               <a:rPr lang="en-US" smtClean="0"/>
-              <a:t>8/7/2018</a:t>
+              <a:t>9/21/18</a:t>
             </a:fld>
             <a:endParaRPr lang="en-US"/>
           </a:p>
@@ -1885,7 +1885,7 @@
           <a:p>
             <a:fld id="{78C97017-6FC3-485B-9764-EAC9E56C1D49}" type="datetimeFigureOut">
               <a:rPr lang="en-US" smtClean="0"/>
-              <a:t>8/7/2018</a:t>
+              <a:t>9/21/18</a:t>
             </a:fld>
             <a:endParaRPr lang="en-US"/>
           </a:p>
@@ -1980,7 +1980,7 @@
           <a:p>
             <a:fld id="{78C97017-6FC3-485B-9764-EAC9E56C1D49}" type="datetimeFigureOut">
               <a:rPr lang="en-US" smtClean="0"/>
-              <a:t>8/7/2018</a:t>
+              <a:t>9/21/18</a:t>
             </a:fld>
             <a:endParaRPr lang="en-US"/>
           </a:p>
@@ -2255,7 +2255,7 @@
           <a:p>
             <a:fld id="{78C97017-6FC3-485B-9764-EAC9E56C1D49}" type="datetimeFigureOut">
               <a:rPr lang="en-US" smtClean="0"/>
-              <a:t>8/7/2018</a:t>
+              <a:t>9/21/18</a:t>
             </a:fld>
             <a:endParaRPr lang="en-US"/>
           </a:p>
@@ -2507,7 +2507,7 @@
           <a:p>
             <a:fld id="{78C97017-6FC3-485B-9764-EAC9E56C1D49}" type="datetimeFigureOut">
               <a:rPr lang="en-US" smtClean="0"/>
-              <a:t>8/7/2018</a:t>
+              <a:t>9/21/18</a:t>
             </a:fld>
             <a:endParaRPr lang="en-US"/>
           </a:p>
@@ -2718,7 +2718,7 @@
           <a:p>
             <a:fld id="{78C97017-6FC3-485B-9764-EAC9E56C1D49}" type="datetimeFigureOut">
               <a:rPr lang="en-US" smtClean="0"/>
-              <a:t>8/7/2018</a:t>
+              <a:t>9/21/18</a:t>
             </a:fld>
             <a:endParaRPr lang="en-US"/>
           </a:p>
@@ -4422,7 +4422,7 @@
             <a:pPr algn="ctr"/>
             <a:r>
               <a:rPr lang="en-US" sz="1050" dirty="0" err="1"/>
-              <a:t>CrearCommand</a:t>
+              <a:t>ClearCommand</a:t>
             </a:r>
             <a:endParaRPr lang="en-SG" sz="1050" dirty="0"/>
           </a:p>

</xml_diff>